<commit_message>
Shelled out the ppt
</commit_message>
<xml_diff>
--- a/Modules/02.working-with-input-controls/Slides.pptx
+++ b/Modules/02.working-with-input-controls/Slides.pptx
@@ -5,10 +5,10 @@
     <p:sldMasterId id="2147483731" r:id="rId4"/>
   </p:sldMasterIdLst>
   <p:notesMasterIdLst>
-    <p:notesMasterId r:id="rId13"/>
+    <p:notesMasterId r:id="rId19"/>
   </p:notesMasterIdLst>
   <p:handoutMasterIdLst>
-    <p:handoutMasterId r:id="rId14"/>
+    <p:handoutMasterId r:id="rId20"/>
   </p:handoutMasterIdLst>
   <p:sldIdLst>
     <p:sldId id="356" r:id="rId5"/>
@@ -18,7 +18,13 @@
     <p:sldId id="358" r:id="rId9"/>
     <p:sldId id="379" r:id="rId10"/>
     <p:sldId id="380" r:id="rId11"/>
-    <p:sldId id="378" r:id="rId12"/>
+    <p:sldId id="381" r:id="rId12"/>
+    <p:sldId id="382" r:id="rId13"/>
+    <p:sldId id="383" r:id="rId14"/>
+    <p:sldId id="384" r:id="rId15"/>
+    <p:sldId id="385" r:id="rId16"/>
+    <p:sldId id="386" r:id="rId17"/>
+    <p:sldId id="378" r:id="rId18"/>
   </p:sldIdLst>
   <p:sldSz cx="9144000" cy="6858000" type="screen4x3"/>
   <p:notesSz cx="7315200" cy="9601200"/>
@@ -159,6 +165,12 @@
             <p14:sldId id="358"/>
             <p14:sldId id="379"/>
             <p14:sldId id="380"/>
+            <p14:sldId id="381"/>
+            <p14:sldId id="382"/>
+            <p14:sldId id="383"/>
+            <p14:sldId id="384"/>
+            <p14:sldId id="385"/>
+            <p14:sldId id="386"/>
             <p14:sldId id="378"/>
           </p14:sldIdLst>
         </p14:section>
@@ -860,52 +872,30 @@
           <a:p>
             <a:r>
               <a:rPr lang="en-US" dirty="0" smtClean="0"/>
-              <a:t>Hello and welcome to the Html for the XAML developer course,</a:t>
+              <a:t>Hello and welcome to module 2 of knockout for the </a:t>
+            </a:r>
+            <a:r>
+              <a:rPr lang="en-US" dirty="0" err="1" smtClean="0"/>
+              <a:t>xaml</a:t>
+            </a:r>
+            <a:r>
+              <a:rPr lang="en-US" dirty="0" smtClean="0"/>
+              <a:t> developer, I am your host Derik Whittaker.  </a:t>
+            </a:r>
+          </a:p>
+          <a:p>
+            <a:endParaRPr lang="en-US" dirty="0" smtClean="0"/>
+          </a:p>
+          <a:p>
+            <a:r>
+              <a:rPr lang="en-US" dirty="0" smtClean="0"/>
+              <a:t>We are going</a:t>
             </a:r>
             <a:r>
               <a:rPr lang="en-US" baseline="0" dirty="0" smtClean="0"/>
-              <a:t> I am your host Derik Whittaker.</a:t>
+              <a:t> to focus our efforts in this module on learning to work with data input controls.</a:t>
             </a:r>
             <a:endParaRPr lang="en-US" dirty="0" smtClean="0"/>
-          </a:p>
-          <a:p>
-            <a:endParaRPr lang="en-US" dirty="0" smtClean="0"/>
-          </a:p>
-          <a:p>
-            <a:r>
-              <a:rPr lang="en-US" dirty="0" smtClean="0"/>
-              <a:t>In</a:t>
-            </a:r>
-            <a:r>
-              <a:rPr lang="en-US" baseline="0" dirty="0" smtClean="0"/>
-              <a:t> this course we are learn how the skills you have acquired while building Silverlight or WPF applications can be applied to building HTML applications.  We will be take a look at an existing Silverlight application and learn how we can port or rebuild this application using HTML.  We will specifically focus on the MVVM design pattern while we learn how to apply our skills to HTML.  You will learn how your knowledge of View Model layout, Data Binding and Commanding will translate to HTML applications via Knockout </a:t>
-            </a:r>
-            <a:r>
-              <a:rPr lang="en-US" baseline="0" dirty="0" err="1" smtClean="0"/>
-              <a:t>js</a:t>
-            </a:r>
-            <a:r>
-              <a:rPr lang="en-US" baseline="0" dirty="0" smtClean="0"/>
-              <a:t>.  As well as learn how the concepts of converters and styles can be applied to an HTML application to get the same net result you would expect if you were building a XAML based application.</a:t>
-            </a:r>
-          </a:p>
-          <a:p>
-            <a:endParaRPr lang="en-US" baseline="0" dirty="0" smtClean="0"/>
-          </a:p>
-          <a:p>
-            <a:r>
-              <a:rPr lang="en-US" baseline="0" dirty="0" smtClean="0"/>
-              <a:t>During this course we are going to look at many different tools and library's and we will explore each of them in enough detail to allow you to get rolling. However we will not be going into great depth in most of the tools as there are other great courses on </a:t>
-            </a:r>
-            <a:r>
-              <a:rPr lang="en-US" baseline="0" dirty="0" err="1" smtClean="0"/>
-              <a:t>pluralsight</a:t>
-            </a:r>
-            <a:r>
-              <a:rPr lang="en-US" baseline="0" dirty="0" smtClean="0"/>
-              <a:t> which cover these tools in greater detail.</a:t>
-            </a:r>
-            <a:endParaRPr lang="en-US" dirty="0"/>
           </a:p>
         </p:txBody>
       </p:sp>
@@ -942,6 +932,488 @@
     <p:extLst>
       <p:ext uri="{BB962C8B-B14F-4D97-AF65-F5344CB8AC3E}">
         <p14:creationId xmlns:p14="http://schemas.microsoft.com/office/powerpoint/2010/main" val="3178655069"/>
+      </p:ext>
+    </p:extLst>
+  </p:cSld>
+  <p:clrMapOvr>
+    <a:masterClrMapping/>
+  </p:clrMapOvr>
+</p:notes>
+</file>
+
+<file path=ppt/notesSlides/notesSlide10.xml><?xml version="1.0" encoding="utf-8"?>
+<p:notes xmlns:a="http://schemas.openxmlformats.org/drawingml/2006/main" xmlns:r="http://schemas.openxmlformats.org/officeDocument/2006/relationships" xmlns:p="http://schemas.openxmlformats.org/presentationml/2006/main">
+  <p:cSld>
+    <p:spTree>
+      <p:nvGrpSpPr>
+        <p:cNvPr id="1" name=""/>
+        <p:cNvGrpSpPr/>
+        <p:nvPr/>
+      </p:nvGrpSpPr>
+      <p:grpSpPr>
+        <a:xfrm>
+          <a:off x="0" y="0"/>
+          <a:ext cx="0" cy="0"/>
+          <a:chOff x="0" y="0"/>
+          <a:chExt cx="0" cy="0"/>
+        </a:xfrm>
+      </p:grpSpPr>
+      <p:sp>
+        <p:nvSpPr>
+          <p:cNvPr id="2" name="Slide Image Placeholder 1"/>
+          <p:cNvSpPr>
+            <a:spLocks noGrp="1" noRot="1" noChangeAspect="1"/>
+          </p:cNvSpPr>
+          <p:nvPr>
+            <p:ph type="sldImg"/>
+          </p:nvPr>
+        </p:nvSpPr>
+        <p:spPr/>
+      </p:sp>
+      <p:sp>
+        <p:nvSpPr>
+          <p:cNvPr id="3" name="Notes Placeholder 2"/>
+          <p:cNvSpPr>
+            <a:spLocks noGrp="1"/>
+          </p:cNvSpPr>
+          <p:nvPr>
+            <p:ph type="body" idx="1"/>
+          </p:nvPr>
+        </p:nvSpPr>
+        <p:spPr/>
+        <p:txBody>
+          <a:bodyPr/>
+          <a:lstStyle/>
+          <a:p>
+            <a:endParaRPr lang="en-US" dirty="0"/>
+          </a:p>
+        </p:txBody>
+      </p:sp>
+      <p:sp>
+        <p:nvSpPr>
+          <p:cNvPr id="4" name="Slide Number Placeholder 3"/>
+          <p:cNvSpPr>
+            <a:spLocks noGrp="1"/>
+          </p:cNvSpPr>
+          <p:nvPr>
+            <p:ph type="sldNum" sz="quarter" idx="10"/>
+          </p:nvPr>
+        </p:nvSpPr>
+        <p:spPr/>
+        <p:txBody>
+          <a:bodyPr/>
+          <a:lstStyle/>
+          <a:p>
+            <a:pPr>
+              <a:defRPr/>
+            </a:pPr>
+            <a:fld id="{47C584BF-6945-4E60-B2A7-1638FF8EA8EE}" type="slidenum">
+              <a:rPr lang="en-US" smtClean="0">
+                <a:solidFill>
+                  <a:srgbClr val="000000"/>
+                </a:solidFill>
+              </a:rPr>
+              <a:pPr>
+                <a:defRPr/>
+              </a:pPr>
+              <a:t>10</a:t>
+            </a:fld>
+            <a:endParaRPr lang="en-US">
+              <a:solidFill>
+                <a:srgbClr val="000000"/>
+              </a:solidFill>
+            </a:endParaRPr>
+          </a:p>
+        </p:txBody>
+      </p:sp>
+    </p:spTree>
+    <p:extLst>
+      <p:ext uri="{BB962C8B-B14F-4D97-AF65-F5344CB8AC3E}">
+        <p14:creationId xmlns:p14="http://schemas.microsoft.com/office/powerpoint/2010/main" val="1686684365"/>
+      </p:ext>
+    </p:extLst>
+  </p:cSld>
+  <p:clrMapOvr>
+    <a:masterClrMapping/>
+  </p:clrMapOvr>
+</p:notes>
+</file>
+
+<file path=ppt/notesSlides/notesSlide11.xml><?xml version="1.0" encoding="utf-8"?>
+<p:notes xmlns:a="http://schemas.openxmlformats.org/drawingml/2006/main" xmlns:r="http://schemas.openxmlformats.org/officeDocument/2006/relationships" xmlns:p="http://schemas.openxmlformats.org/presentationml/2006/main">
+  <p:cSld>
+    <p:spTree>
+      <p:nvGrpSpPr>
+        <p:cNvPr id="1" name=""/>
+        <p:cNvGrpSpPr/>
+        <p:nvPr/>
+      </p:nvGrpSpPr>
+      <p:grpSpPr>
+        <a:xfrm>
+          <a:off x="0" y="0"/>
+          <a:ext cx="0" cy="0"/>
+          <a:chOff x="0" y="0"/>
+          <a:chExt cx="0" cy="0"/>
+        </a:xfrm>
+      </p:grpSpPr>
+      <p:sp>
+        <p:nvSpPr>
+          <p:cNvPr id="2" name="Slide Image Placeholder 1"/>
+          <p:cNvSpPr>
+            <a:spLocks noGrp="1" noRot="1" noChangeAspect="1"/>
+          </p:cNvSpPr>
+          <p:nvPr>
+            <p:ph type="sldImg"/>
+          </p:nvPr>
+        </p:nvSpPr>
+        <p:spPr/>
+      </p:sp>
+      <p:sp>
+        <p:nvSpPr>
+          <p:cNvPr id="3" name="Notes Placeholder 2"/>
+          <p:cNvSpPr>
+            <a:spLocks noGrp="1"/>
+          </p:cNvSpPr>
+          <p:nvPr>
+            <p:ph type="body" idx="1"/>
+          </p:nvPr>
+        </p:nvSpPr>
+        <p:spPr/>
+        <p:txBody>
+          <a:bodyPr/>
+          <a:lstStyle/>
+          <a:p>
+            <a:endParaRPr lang="en-US" dirty="0"/>
+          </a:p>
+        </p:txBody>
+      </p:sp>
+      <p:sp>
+        <p:nvSpPr>
+          <p:cNvPr id="4" name="Slide Number Placeholder 3"/>
+          <p:cNvSpPr>
+            <a:spLocks noGrp="1"/>
+          </p:cNvSpPr>
+          <p:nvPr>
+            <p:ph type="sldNum" sz="quarter" idx="10"/>
+          </p:nvPr>
+        </p:nvSpPr>
+        <p:spPr/>
+        <p:txBody>
+          <a:bodyPr/>
+          <a:lstStyle/>
+          <a:p>
+            <a:pPr>
+              <a:defRPr/>
+            </a:pPr>
+            <a:fld id="{47C584BF-6945-4E60-B2A7-1638FF8EA8EE}" type="slidenum">
+              <a:rPr lang="en-US" smtClean="0">
+                <a:solidFill>
+                  <a:srgbClr val="000000"/>
+                </a:solidFill>
+              </a:rPr>
+              <a:pPr>
+                <a:defRPr/>
+              </a:pPr>
+              <a:t>11</a:t>
+            </a:fld>
+            <a:endParaRPr lang="en-US">
+              <a:solidFill>
+                <a:srgbClr val="000000"/>
+              </a:solidFill>
+            </a:endParaRPr>
+          </a:p>
+        </p:txBody>
+      </p:sp>
+    </p:spTree>
+    <p:extLst>
+      <p:ext uri="{BB962C8B-B14F-4D97-AF65-F5344CB8AC3E}">
+        <p14:creationId xmlns:p14="http://schemas.microsoft.com/office/powerpoint/2010/main" val="2648717330"/>
+      </p:ext>
+    </p:extLst>
+  </p:cSld>
+  <p:clrMapOvr>
+    <a:masterClrMapping/>
+  </p:clrMapOvr>
+</p:notes>
+</file>
+
+<file path=ppt/notesSlides/notesSlide12.xml><?xml version="1.0" encoding="utf-8"?>
+<p:notes xmlns:a="http://schemas.openxmlformats.org/drawingml/2006/main" xmlns:r="http://schemas.openxmlformats.org/officeDocument/2006/relationships" xmlns:p="http://schemas.openxmlformats.org/presentationml/2006/main">
+  <p:cSld>
+    <p:spTree>
+      <p:nvGrpSpPr>
+        <p:cNvPr id="1" name=""/>
+        <p:cNvGrpSpPr/>
+        <p:nvPr/>
+      </p:nvGrpSpPr>
+      <p:grpSpPr>
+        <a:xfrm>
+          <a:off x="0" y="0"/>
+          <a:ext cx="0" cy="0"/>
+          <a:chOff x="0" y="0"/>
+          <a:chExt cx="0" cy="0"/>
+        </a:xfrm>
+      </p:grpSpPr>
+      <p:sp>
+        <p:nvSpPr>
+          <p:cNvPr id="2" name="Slide Image Placeholder 1"/>
+          <p:cNvSpPr>
+            <a:spLocks noGrp="1" noRot="1" noChangeAspect="1"/>
+          </p:cNvSpPr>
+          <p:nvPr>
+            <p:ph type="sldImg"/>
+          </p:nvPr>
+        </p:nvSpPr>
+        <p:spPr/>
+      </p:sp>
+      <p:sp>
+        <p:nvSpPr>
+          <p:cNvPr id="3" name="Notes Placeholder 2"/>
+          <p:cNvSpPr>
+            <a:spLocks noGrp="1"/>
+          </p:cNvSpPr>
+          <p:nvPr>
+            <p:ph type="body" idx="1"/>
+          </p:nvPr>
+        </p:nvSpPr>
+        <p:spPr/>
+        <p:txBody>
+          <a:bodyPr/>
+          <a:lstStyle/>
+          <a:p>
+            <a:endParaRPr lang="en-US" dirty="0"/>
+          </a:p>
+        </p:txBody>
+      </p:sp>
+      <p:sp>
+        <p:nvSpPr>
+          <p:cNvPr id="4" name="Slide Number Placeholder 3"/>
+          <p:cNvSpPr>
+            <a:spLocks noGrp="1"/>
+          </p:cNvSpPr>
+          <p:nvPr>
+            <p:ph type="sldNum" sz="quarter" idx="10"/>
+          </p:nvPr>
+        </p:nvSpPr>
+        <p:spPr/>
+        <p:txBody>
+          <a:bodyPr/>
+          <a:lstStyle/>
+          <a:p>
+            <a:pPr>
+              <a:defRPr/>
+            </a:pPr>
+            <a:fld id="{47C584BF-6945-4E60-B2A7-1638FF8EA8EE}" type="slidenum">
+              <a:rPr lang="en-US" smtClean="0">
+                <a:solidFill>
+                  <a:srgbClr val="000000"/>
+                </a:solidFill>
+              </a:rPr>
+              <a:pPr>
+                <a:defRPr/>
+              </a:pPr>
+              <a:t>12</a:t>
+            </a:fld>
+            <a:endParaRPr lang="en-US">
+              <a:solidFill>
+                <a:srgbClr val="000000"/>
+              </a:solidFill>
+            </a:endParaRPr>
+          </a:p>
+        </p:txBody>
+      </p:sp>
+    </p:spTree>
+    <p:extLst>
+      <p:ext uri="{BB962C8B-B14F-4D97-AF65-F5344CB8AC3E}">
+        <p14:creationId xmlns:p14="http://schemas.microsoft.com/office/powerpoint/2010/main" val="2440829299"/>
+      </p:ext>
+    </p:extLst>
+  </p:cSld>
+  <p:clrMapOvr>
+    <a:masterClrMapping/>
+  </p:clrMapOvr>
+</p:notes>
+</file>
+
+<file path=ppt/notesSlides/notesSlide13.xml><?xml version="1.0" encoding="utf-8"?>
+<p:notes xmlns:a="http://schemas.openxmlformats.org/drawingml/2006/main" xmlns:r="http://schemas.openxmlformats.org/officeDocument/2006/relationships" xmlns:p="http://schemas.openxmlformats.org/presentationml/2006/main">
+  <p:cSld>
+    <p:spTree>
+      <p:nvGrpSpPr>
+        <p:cNvPr id="1" name=""/>
+        <p:cNvGrpSpPr/>
+        <p:nvPr/>
+      </p:nvGrpSpPr>
+      <p:grpSpPr>
+        <a:xfrm>
+          <a:off x="0" y="0"/>
+          <a:ext cx="0" cy="0"/>
+          <a:chOff x="0" y="0"/>
+          <a:chExt cx="0" cy="0"/>
+        </a:xfrm>
+      </p:grpSpPr>
+      <p:sp>
+        <p:nvSpPr>
+          <p:cNvPr id="2" name="Slide Image Placeholder 1"/>
+          <p:cNvSpPr>
+            <a:spLocks noGrp="1" noRot="1" noChangeAspect="1"/>
+          </p:cNvSpPr>
+          <p:nvPr>
+            <p:ph type="sldImg"/>
+          </p:nvPr>
+        </p:nvSpPr>
+        <p:spPr/>
+      </p:sp>
+      <p:sp>
+        <p:nvSpPr>
+          <p:cNvPr id="3" name="Notes Placeholder 2"/>
+          <p:cNvSpPr>
+            <a:spLocks noGrp="1"/>
+          </p:cNvSpPr>
+          <p:nvPr>
+            <p:ph type="body" idx="1"/>
+          </p:nvPr>
+        </p:nvSpPr>
+        <p:spPr/>
+        <p:txBody>
+          <a:bodyPr/>
+          <a:lstStyle/>
+          <a:p>
+            <a:endParaRPr lang="en-US" dirty="0"/>
+          </a:p>
+        </p:txBody>
+      </p:sp>
+      <p:sp>
+        <p:nvSpPr>
+          <p:cNvPr id="4" name="Slide Number Placeholder 3"/>
+          <p:cNvSpPr>
+            <a:spLocks noGrp="1"/>
+          </p:cNvSpPr>
+          <p:nvPr>
+            <p:ph type="sldNum" sz="quarter" idx="10"/>
+          </p:nvPr>
+        </p:nvSpPr>
+        <p:spPr/>
+        <p:txBody>
+          <a:bodyPr/>
+          <a:lstStyle/>
+          <a:p>
+            <a:pPr>
+              <a:defRPr/>
+            </a:pPr>
+            <a:fld id="{47C584BF-6945-4E60-B2A7-1638FF8EA8EE}" type="slidenum">
+              <a:rPr lang="en-US" smtClean="0">
+                <a:solidFill>
+                  <a:srgbClr val="000000"/>
+                </a:solidFill>
+              </a:rPr>
+              <a:pPr>
+                <a:defRPr/>
+              </a:pPr>
+              <a:t>13</a:t>
+            </a:fld>
+            <a:endParaRPr lang="en-US">
+              <a:solidFill>
+                <a:srgbClr val="000000"/>
+              </a:solidFill>
+            </a:endParaRPr>
+          </a:p>
+        </p:txBody>
+      </p:sp>
+    </p:spTree>
+    <p:extLst>
+      <p:ext uri="{BB962C8B-B14F-4D97-AF65-F5344CB8AC3E}">
+        <p14:creationId xmlns:p14="http://schemas.microsoft.com/office/powerpoint/2010/main" val="3747604384"/>
+      </p:ext>
+    </p:extLst>
+  </p:cSld>
+  <p:clrMapOvr>
+    <a:masterClrMapping/>
+  </p:clrMapOvr>
+</p:notes>
+</file>
+
+<file path=ppt/notesSlides/notesSlide14.xml><?xml version="1.0" encoding="utf-8"?>
+<p:notes xmlns:a="http://schemas.openxmlformats.org/drawingml/2006/main" xmlns:r="http://schemas.openxmlformats.org/officeDocument/2006/relationships" xmlns:p="http://schemas.openxmlformats.org/presentationml/2006/main">
+  <p:cSld>
+    <p:spTree>
+      <p:nvGrpSpPr>
+        <p:cNvPr id="1" name=""/>
+        <p:cNvGrpSpPr/>
+        <p:nvPr/>
+      </p:nvGrpSpPr>
+      <p:grpSpPr>
+        <a:xfrm>
+          <a:off x="0" y="0"/>
+          <a:ext cx="0" cy="0"/>
+          <a:chOff x="0" y="0"/>
+          <a:chExt cx="0" cy="0"/>
+        </a:xfrm>
+      </p:grpSpPr>
+      <p:sp>
+        <p:nvSpPr>
+          <p:cNvPr id="2" name="Slide Image Placeholder 1"/>
+          <p:cNvSpPr>
+            <a:spLocks noGrp="1" noRot="1" noChangeAspect="1"/>
+          </p:cNvSpPr>
+          <p:nvPr>
+            <p:ph type="sldImg"/>
+          </p:nvPr>
+        </p:nvSpPr>
+        <p:spPr/>
+      </p:sp>
+      <p:sp>
+        <p:nvSpPr>
+          <p:cNvPr id="3" name="Notes Placeholder 2"/>
+          <p:cNvSpPr>
+            <a:spLocks noGrp="1"/>
+          </p:cNvSpPr>
+          <p:nvPr>
+            <p:ph type="body" idx="1"/>
+          </p:nvPr>
+        </p:nvSpPr>
+        <p:spPr/>
+        <p:txBody>
+          <a:bodyPr/>
+          <a:lstStyle/>
+          <a:p>
+            <a:endParaRPr lang="en-US" dirty="0"/>
+          </a:p>
+        </p:txBody>
+      </p:sp>
+      <p:sp>
+        <p:nvSpPr>
+          <p:cNvPr id="4" name="Slide Number Placeholder 3"/>
+          <p:cNvSpPr>
+            <a:spLocks noGrp="1"/>
+          </p:cNvSpPr>
+          <p:nvPr>
+            <p:ph type="sldNum" sz="quarter" idx="10"/>
+          </p:nvPr>
+        </p:nvSpPr>
+        <p:spPr/>
+        <p:txBody>
+          <a:bodyPr/>
+          <a:lstStyle/>
+          <a:p>
+            <a:pPr>
+              <a:defRPr/>
+            </a:pPr>
+            <a:fld id="{47C584BF-6945-4E60-B2A7-1638FF8EA8EE}" type="slidenum">
+              <a:rPr lang="en-US" smtClean="0"/>
+              <a:pPr>
+                <a:defRPr/>
+              </a:pPr>
+              <a:t>14</a:t>
+            </a:fld>
+            <a:endParaRPr lang="en-US"/>
+          </a:p>
+        </p:txBody>
+      </p:sp>
+    </p:spTree>
+    <p:extLst>
+      <p:ext uri="{BB962C8B-B14F-4D97-AF65-F5344CB8AC3E}">
+        <p14:creationId xmlns:p14="http://schemas.microsoft.com/office/powerpoint/2010/main" val="4217989557"/>
       </p:ext>
     </p:extLst>
   </p:cSld>
@@ -1543,100 +2015,6 @@
           <a:bodyPr/>
           <a:lstStyle/>
           <a:p>
-            <a:r>
-              <a:rPr lang="en-US" dirty="0" smtClean="0"/>
-              <a:t>In this module we explored</a:t>
-            </a:r>
-            <a:r>
-              <a:rPr lang="en-US" baseline="0" dirty="0" smtClean="0"/>
-              <a:t> everything we needed to know in order to get primed for making the transition from being a XAML developer to an HTML developer.  </a:t>
-            </a:r>
-          </a:p>
-          <a:p>
-            <a:endParaRPr lang="en-US" baseline="0" dirty="0" smtClean="0"/>
-          </a:p>
-          <a:p>
-            <a:r>
-              <a:rPr lang="en-US" baseline="0" dirty="0" smtClean="0"/>
-              <a:t>We took a look at how some of you </a:t>
-            </a:r>
-            <a:r>
-              <a:rPr lang="en-US" baseline="0" dirty="0" err="1" smtClean="0"/>
-              <a:t>xaml</a:t>
-            </a:r>
-            <a:r>
-              <a:rPr lang="en-US" baseline="0" dirty="0" smtClean="0"/>
-              <a:t> skills, such as binding and commanding, can easily translate to building HTML applications</a:t>
-            </a:r>
-          </a:p>
-          <a:p>
-            <a:endParaRPr lang="en-US" baseline="0" dirty="0" smtClean="0"/>
-          </a:p>
-          <a:p>
-            <a:r>
-              <a:rPr lang="en-US" baseline="0" dirty="0" smtClean="0"/>
-              <a:t>We learned about many of the tools we will be using through this course, such as Knockout </a:t>
-            </a:r>
-            <a:r>
-              <a:rPr lang="en-US" baseline="0" dirty="0" err="1" smtClean="0"/>
-              <a:t>js</a:t>
-            </a:r>
-            <a:r>
-              <a:rPr lang="en-US" baseline="0" dirty="0" smtClean="0"/>
-              <a:t>, typescript and </a:t>
-            </a:r>
-            <a:r>
-              <a:rPr lang="en-US" baseline="0" dirty="0" err="1" smtClean="0"/>
-              <a:t>ASP.Net</a:t>
-            </a:r>
-            <a:r>
-              <a:rPr lang="en-US" baseline="0" dirty="0" smtClean="0"/>
-              <a:t> MVC</a:t>
-            </a:r>
-          </a:p>
-          <a:p>
-            <a:endParaRPr lang="en-US" baseline="0" dirty="0" smtClean="0"/>
-          </a:p>
-          <a:p>
-            <a:r>
-              <a:rPr lang="en-US" baseline="0" dirty="0" smtClean="0"/>
-              <a:t>We built our </a:t>
-            </a:r>
-            <a:r>
-              <a:rPr lang="en-US" baseline="0" dirty="0" err="1" smtClean="0"/>
-              <a:t>Asp.Net</a:t>
-            </a:r>
-            <a:r>
-              <a:rPr lang="en-US" baseline="0" dirty="0" smtClean="0"/>
-              <a:t> MVC template project which we will use as our base project during this course</a:t>
-            </a:r>
-          </a:p>
-          <a:p>
-            <a:endParaRPr lang="en-US" baseline="0" dirty="0" smtClean="0"/>
-          </a:p>
-          <a:p>
-            <a:r>
-              <a:rPr lang="en-US" baseline="0" dirty="0" smtClean="0"/>
-              <a:t>We built a very simple hello world application to demonstrate how to use some of the tools we will be learning about during this course</a:t>
-            </a:r>
-          </a:p>
-          <a:p>
-            <a:endParaRPr lang="en-US" baseline="0" dirty="0" smtClean="0"/>
-          </a:p>
-          <a:p>
-            <a:r>
-              <a:rPr lang="en-US" baseline="0" dirty="0" smtClean="0"/>
-              <a:t>We ended up by reviewing our reference Silverlight application we are going to be porting over to html in order to better understand our objectives for the course</a:t>
-            </a:r>
-          </a:p>
-          <a:p>
-            <a:endParaRPr lang="en-US" baseline="0" dirty="0" smtClean="0"/>
-          </a:p>
-          <a:p>
-            <a:r>
-              <a:rPr lang="en-US" baseline="0" dirty="0" smtClean="0"/>
-              <a:t>In the next module we will dive straight in and start the actual port of our reference application to html</a:t>
-            </a:r>
             <a:endParaRPr lang="en-US" dirty="0"/>
           </a:p>
         </p:txBody>
@@ -1673,7 +2051,105 @@
     </p:spTree>
     <p:extLst>
       <p:ext uri="{BB962C8B-B14F-4D97-AF65-F5344CB8AC3E}">
-        <p14:creationId xmlns:p14="http://schemas.microsoft.com/office/powerpoint/2010/main" val="4217989557"/>
+        <p14:creationId xmlns:p14="http://schemas.microsoft.com/office/powerpoint/2010/main" val="1906116575"/>
+      </p:ext>
+    </p:extLst>
+  </p:cSld>
+  <p:clrMapOvr>
+    <a:masterClrMapping/>
+  </p:clrMapOvr>
+</p:notes>
+</file>
+
+<file path=ppt/notesSlides/notesSlide9.xml><?xml version="1.0" encoding="utf-8"?>
+<p:notes xmlns:a="http://schemas.openxmlformats.org/drawingml/2006/main" xmlns:r="http://schemas.openxmlformats.org/officeDocument/2006/relationships" xmlns:p="http://schemas.openxmlformats.org/presentationml/2006/main">
+  <p:cSld>
+    <p:spTree>
+      <p:nvGrpSpPr>
+        <p:cNvPr id="1" name=""/>
+        <p:cNvGrpSpPr/>
+        <p:nvPr/>
+      </p:nvGrpSpPr>
+      <p:grpSpPr>
+        <a:xfrm>
+          <a:off x="0" y="0"/>
+          <a:ext cx="0" cy="0"/>
+          <a:chOff x="0" y="0"/>
+          <a:chExt cx="0" cy="0"/>
+        </a:xfrm>
+      </p:grpSpPr>
+      <p:sp>
+        <p:nvSpPr>
+          <p:cNvPr id="2" name="Slide Image Placeholder 1"/>
+          <p:cNvSpPr>
+            <a:spLocks noGrp="1" noRot="1" noChangeAspect="1"/>
+          </p:cNvSpPr>
+          <p:nvPr>
+            <p:ph type="sldImg"/>
+          </p:nvPr>
+        </p:nvSpPr>
+        <p:spPr/>
+      </p:sp>
+      <p:sp>
+        <p:nvSpPr>
+          <p:cNvPr id="3" name="Notes Placeholder 2"/>
+          <p:cNvSpPr>
+            <a:spLocks noGrp="1"/>
+          </p:cNvSpPr>
+          <p:nvPr>
+            <p:ph type="body" idx="1"/>
+          </p:nvPr>
+        </p:nvSpPr>
+        <p:spPr/>
+        <p:txBody>
+          <a:bodyPr/>
+          <a:lstStyle/>
+          <a:p>
+            <a:endParaRPr lang="en-US" dirty="0"/>
+          </a:p>
+        </p:txBody>
+      </p:sp>
+      <p:sp>
+        <p:nvSpPr>
+          <p:cNvPr id="4" name="Slide Number Placeholder 3"/>
+          <p:cNvSpPr>
+            <a:spLocks noGrp="1"/>
+          </p:cNvSpPr>
+          <p:nvPr>
+            <p:ph type="sldNum" sz="quarter" idx="10"/>
+          </p:nvPr>
+        </p:nvSpPr>
+        <p:spPr/>
+        <p:txBody>
+          <a:bodyPr/>
+          <a:lstStyle/>
+          <a:p>
+            <a:pPr>
+              <a:defRPr/>
+            </a:pPr>
+            <a:fld id="{47C584BF-6945-4E60-B2A7-1638FF8EA8EE}" type="slidenum">
+              <a:rPr lang="en-US" smtClean="0">
+                <a:solidFill>
+                  <a:srgbClr val="000000"/>
+                </a:solidFill>
+              </a:rPr>
+              <a:pPr>
+                <a:defRPr/>
+              </a:pPr>
+              <a:t>9</a:t>
+            </a:fld>
+            <a:endParaRPr lang="en-US">
+              <a:solidFill>
+                <a:srgbClr val="000000"/>
+              </a:solidFill>
+            </a:endParaRPr>
+          </a:p>
+        </p:txBody>
+      </p:sp>
+    </p:spTree>
+    <p:extLst>
+      <p:ext uri="{BB962C8B-B14F-4D97-AF65-F5344CB8AC3E}">
+        <p14:creationId xmlns:p14="http://schemas.microsoft.com/office/powerpoint/2010/main" val="3104867663"/>
       </p:ext>
     </p:extLst>
   </p:cSld>
@@ -3430,6 +3906,585 @@
       <p:transition/>
     </mc:Fallback>
   </mc:AlternateContent>
+  <p:timing>
+    <p:tnLst>
+      <p:par>
+        <p:cTn id="1" dur="indefinite" restart="never" nodeType="tmRoot"/>
+      </p:par>
+    </p:tnLst>
+  </p:timing>
+</p:sld>
+</file>
+
+<file path=ppt/slides/slide10.xml><?xml version="1.0" encoding="utf-8"?>
+<p:sld xmlns:a="http://schemas.openxmlformats.org/drawingml/2006/main" xmlns:r="http://schemas.openxmlformats.org/officeDocument/2006/relationships" xmlns:p="http://schemas.openxmlformats.org/presentationml/2006/main">
+  <p:cSld>
+    <p:spTree>
+      <p:nvGrpSpPr>
+        <p:cNvPr id="1" name=""/>
+        <p:cNvGrpSpPr/>
+        <p:nvPr/>
+      </p:nvGrpSpPr>
+      <p:grpSpPr>
+        <a:xfrm>
+          <a:off x="0" y="0"/>
+          <a:ext cx="0" cy="0"/>
+          <a:chOff x="0" y="0"/>
+          <a:chExt cx="0" cy="0"/>
+        </a:xfrm>
+      </p:grpSpPr>
+      <p:sp>
+        <p:nvSpPr>
+          <p:cNvPr id="2" name="Title 1"/>
+          <p:cNvSpPr>
+            <a:spLocks noGrp="1"/>
+          </p:cNvSpPr>
+          <p:nvPr>
+            <p:ph type="title"/>
+          </p:nvPr>
+        </p:nvSpPr>
+        <p:spPr/>
+        <p:txBody>
+          <a:bodyPr/>
+          <a:lstStyle/>
+          <a:p>
+            <a:r>
+              <a:rPr lang="en-US" dirty="0" smtClean="0"/>
+              <a:t>Agenda		</a:t>
+            </a:r>
+            <a:endParaRPr lang="en-GB" dirty="0"/>
+          </a:p>
+        </p:txBody>
+      </p:sp>
+      <p:sp>
+        <p:nvSpPr>
+          <p:cNvPr id="3" name="Text Placeholder 2"/>
+          <p:cNvSpPr>
+            <a:spLocks noGrp="1"/>
+          </p:cNvSpPr>
+          <p:nvPr>
+            <p:ph type="body" idx="1"/>
+          </p:nvPr>
+        </p:nvSpPr>
+        <p:spPr/>
+        <p:txBody>
+          <a:bodyPr/>
+          <a:lstStyle/>
+          <a:p>
+            <a:r>
+              <a:rPr lang="en-US" dirty="0" smtClean="0">
+                <a:latin typeface="+mn-lt"/>
+              </a:rPr>
+              <a:t>Text Input Binding - Value Binder</a:t>
+            </a:r>
+          </a:p>
+          <a:p>
+            <a:r>
+              <a:rPr lang="en-GB" dirty="0" smtClean="0"/>
+              <a:t>Text Display Binding – Text Binder</a:t>
+            </a:r>
+          </a:p>
+          <a:p>
+            <a:r>
+              <a:rPr lang="en-GB" dirty="0" smtClean="0">
+                <a:solidFill>
+                  <a:schemeClr val="accent6">
+                    <a:lumMod val="75000"/>
+                  </a:schemeClr>
+                </a:solidFill>
+              </a:rPr>
+              <a:t>Checkbox/Radio Button Binding – Checked Binder</a:t>
+            </a:r>
+          </a:p>
+          <a:p>
+            <a:r>
+              <a:rPr lang="en-GB" dirty="0" smtClean="0"/>
+              <a:t>Selection Binding – Options Binder</a:t>
+            </a:r>
+            <a:endParaRPr lang="en-GB" dirty="0"/>
+          </a:p>
+        </p:txBody>
+      </p:sp>
+    </p:spTree>
+    <p:extLst>
+      <p:ext uri="{BB962C8B-B14F-4D97-AF65-F5344CB8AC3E}">
+        <p14:creationId xmlns:p14="http://schemas.microsoft.com/office/powerpoint/2010/main" val="512638731"/>
+      </p:ext>
+    </p:extLst>
+  </p:cSld>
+  <p:clrMapOvr>
+    <a:masterClrMapping/>
+  </p:clrMapOvr>
+  <p:transition>
+    <p:fade/>
+  </p:transition>
+  <p:timing>
+    <p:tnLst>
+      <p:par>
+        <p:cTn id="1" dur="indefinite" restart="never" nodeType="tmRoot"/>
+      </p:par>
+    </p:tnLst>
+  </p:timing>
+</p:sld>
+</file>
+
+<file path=ppt/slides/slide11.xml><?xml version="1.0" encoding="utf-8"?>
+<p:sld xmlns:a="http://schemas.openxmlformats.org/drawingml/2006/main" xmlns:r="http://schemas.openxmlformats.org/officeDocument/2006/relationships" xmlns:p="http://schemas.openxmlformats.org/presentationml/2006/main" show="0">
+  <p:cSld>
+    <p:bg>
+      <p:bgPr>
+        <a:solidFill>
+          <a:schemeClr val="accent2"/>
+        </a:solidFill>
+        <a:effectLst/>
+      </p:bgPr>
+    </p:bg>
+    <p:spTree>
+      <p:nvGrpSpPr>
+        <p:cNvPr id="1" name=""/>
+        <p:cNvGrpSpPr/>
+        <p:nvPr/>
+      </p:nvGrpSpPr>
+      <p:grpSpPr>
+        <a:xfrm>
+          <a:off x="0" y="0"/>
+          <a:ext cx="0" cy="0"/>
+          <a:chOff x="0" y="0"/>
+          <a:chExt cx="0" cy="0"/>
+        </a:xfrm>
+      </p:grpSpPr>
+      <p:sp>
+        <p:nvSpPr>
+          <p:cNvPr id="2" name="Title 1"/>
+          <p:cNvSpPr>
+            <a:spLocks noGrp="1"/>
+          </p:cNvSpPr>
+          <p:nvPr>
+            <p:ph type="title"/>
+          </p:nvPr>
+        </p:nvSpPr>
+        <p:spPr/>
+        <p:txBody>
+          <a:bodyPr/>
+          <a:lstStyle/>
+          <a:p>
+            <a:r>
+              <a:rPr lang="en-US" dirty="0" smtClean="0"/>
+              <a:t>END OF Overview Slides		</a:t>
+            </a:r>
+            <a:endParaRPr lang="en-GB" dirty="0"/>
+          </a:p>
+        </p:txBody>
+      </p:sp>
+      <p:sp>
+        <p:nvSpPr>
+          <p:cNvPr id="3" name="Text Placeholder 2"/>
+          <p:cNvSpPr>
+            <a:spLocks noGrp="1"/>
+          </p:cNvSpPr>
+          <p:nvPr>
+            <p:ph type="body" idx="1"/>
+          </p:nvPr>
+        </p:nvSpPr>
+        <p:spPr/>
+        <p:txBody>
+          <a:bodyPr/>
+          <a:lstStyle/>
+          <a:p>
+            <a:pPr marL="0" indent="0">
+              <a:buNone/>
+            </a:pPr>
+            <a:r>
+              <a:rPr lang="en-GB" dirty="0" smtClean="0"/>
+              <a:t>	</a:t>
+            </a:r>
+            <a:endParaRPr lang="en-GB" dirty="0"/>
+          </a:p>
+        </p:txBody>
+      </p:sp>
+    </p:spTree>
+    <p:extLst>
+      <p:ext uri="{BB962C8B-B14F-4D97-AF65-F5344CB8AC3E}">
+        <p14:creationId xmlns:p14="http://schemas.microsoft.com/office/powerpoint/2010/main" val="458107361"/>
+      </p:ext>
+    </p:extLst>
+  </p:cSld>
+  <p:clrMapOvr>
+    <a:masterClrMapping/>
+  </p:clrMapOvr>
+  <p:transition>
+    <p:fade/>
+  </p:transition>
+  <p:timing>
+    <p:tnLst>
+      <p:par>
+        <p:cTn id="1" dur="indefinite" restart="never" nodeType="tmRoot"/>
+      </p:par>
+    </p:tnLst>
+  </p:timing>
+</p:sld>
+</file>
+
+<file path=ppt/slides/slide12.xml><?xml version="1.0" encoding="utf-8"?>
+<p:sld xmlns:a="http://schemas.openxmlformats.org/drawingml/2006/main" xmlns:r="http://schemas.openxmlformats.org/officeDocument/2006/relationships" xmlns:p="http://schemas.openxmlformats.org/presentationml/2006/main">
+  <p:cSld>
+    <p:spTree>
+      <p:nvGrpSpPr>
+        <p:cNvPr id="1" name=""/>
+        <p:cNvGrpSpPr/>
+        <p:nvPr/>
+      </p:nvGrpSpPr>
+      <p:grpSpPr>
+        <a:xfrm>
+          <a:off x="0" y="0"/>
+          <a:ext cx="0" cy="0"/>
+          <a:chOff x="0" y="0"/>
+          <a:chExt cx="0" cy="0"/>
+        </a:xfrm>
+      </p:grpSpPr>
+      <p:sp>
+        <p:nvSpPr>
+          <p:cNvPr id="2" name="Title 1"/>
+          <p:cNvSpPr>
+            <a:spLocks noGrp="1"/>
+          </p:cNvSpPr>
+          <p:nvPr>
+            <p:ph type="title"/>
+          </p:nvPr>
+        </p:nvSpPr>
+        <p:spPr/>
+        <p:txBody>
+          <a:bodyPr/>
+          <a:lstStyle/>
+          <a:p>
+            <a:r>
+              <a:rPr lang="en-US" dirty="0" smtClean="0"/>
+              <a:t>Agenda		</a:t>
+            </a:r>
+            <a:endParaRPr lang="en-GB" dirty="0"/>
+          </a:p>
+        </p:txBody>
+      </p:sp>
+      <p:sp>
+        <p:nvSpPr>
+          <p:cNvPr id="3" name="Text Placeholder 2"/>
+          <p:cNvSpPr>
+            <a:spLocks noGrp="1"/>
+          </p:cNvSpPr>
+          <p:nvPr>
+            <p:ph type="body" idx="1"/>
+          </p:nvPr>
+        </p:nvSpPr>
+        <p:spPr/>
+        <p:txBody>
+          <a:bodyPr/>
+          <a:lstStyle/>
+          <a:p>
+            <a:r>
+              <a:rPr lang="en-US" dirty="0" smtClean="0">
+                <a:latin typeface="+mn-lt"/>
+              </a:rPr>
+              <a:t>Text Input Binding - Value Binder</a:t>
+            </a:r>
+          </a:p>
+          <a:p>
+            <a:r>
+              <a:rPr lang="en-GB" dirty="0" smtClean="0"/>
+              <a:t>Text Display Binding – Text Binder</a:t>
+            </a:r>
+          </a:p>
+          <a:p>
+            <a:r>
+              <a:rPr lang="en-GB" dirty="0" smtClean="0"/>
+              <a:t>Checkbox/Radio Button Binding – Checked Binder</a:t>
+            </a:r>
+          </a:p>
+          <a:p>
+            <a:r>
+              <a:rPr lang="en-GB" dirty="0" smtClean="0">
+                <a:solidFill>
+                  <a:schemeClr val="accent6">
+                    <a:lumMod val="75000"/>
+                  </a:schemeClr>
+                </a:solidFill>
+              </a:rPr>
+              <a:t>Selection Binding – Options Binder</a:t>
+            </a:r>
+            <a:endParaRPr lang="en-GB" dirty="0">
+              <a:solidFill>
+                <a:schemeClr val="accent6">
+                  <a:lumMod val="75000"/>
+                </a:schemeClr>
+              </a:solidFill>
+            </a:endParaRPr>
+          </a:p>
+        </p:txBody>
+      </p:sp>
+    </p:spTree>
+    <p:extLst>
+      <p:ext uri="{BB962C8B-B14F-4D97-AF65-F5344CB8AC3E}">
+        <p14:creationId xmlns:p14="http://schemas.microsoft.com/office/powerpoint/2010/main" val="3243974174"/>
+      </p:ext>
+    </p:extLst>
+  </p:cSld>
+  <p:clrMapOvr>
+    <a:masterClrMapping/>
+  </p:clrMapOvr>
+  <p:transition>
+    <p:fade/>
+  </p:transition>
+  <p:timing>
+    <p:tnLst>
+      <p:par>
+        <p:cTn id="1" dur="indefinite" restart="never" nodeType="tmRoot"/>
+      </p:par>
+    </p:tnLst>
+  </p:timing>
+</p:sld>
+</file>
+
+<file path=ppt/slides/slide13.xml><?xml version="1.0" encoding="utf-8"?>
+<p:sld xmlns:a="http://schemas.openxmlformats.org/drawingml/2006/main" xmlns:r="http://schemas.openxmlformats.org/officeDocument/2006/relationships" xmlns:p="http://schemas.openxmlformats.org/presentationml/2006/main" show="0">
+  <p:cSld>
+    <p:bg>
+      <p:bgPr>
+        <a:solidFill>
+          <a:schemeClr val="accent2"/>
+        </a:solidFill>
+        <a:effectLst/>
+      </p:bgPr>
+    </p:bg>
+    <p:spTree>
+      <p:nvGrpSpPr>
+        <p:cNvPr id="1" name=""/>
+        <p:cNvGrpSpPr/>
+        <p:nvPr/>
+      </p:nvGrpSpPr>
+      <p:grpSpPr>
+        <a:xfrm>
+          <a:off x="0" y="0"/>
+          <a:ext cx="0" cy="0"/>
+          <a:chOff x="0" y="0"/>
+          <a:chExt cx="0" cy="0"/>
+        </a:xfrm>
+      </p:grpSpPr>
+      <p:sp>
+        <p:nvSpPr>
+          <p:cNvPr id="2" name="Title 1"/>
+          <p:cNvSpPr>
+            <a:spLocks noGrp="1"/>
+          </p:cNvSpPr>
+          <p:nvPr>
+            <p:ph type="title"/>
+          </p:nvPr>
+        </p:nvSpPr>
+        <p:spPr/>
+        <p:txBody>
+          <a:bodyPr/>
+          <a:lstStyle/>
+          <a:p>
+            <a:r>
+              <a:rPr lang="en-US" dirty="0" smtClean="0"/>
+              <a:t>END OF Overview Slides		</a:t>
+            </a:r>
+            <a:endParaRPr lang="en-GB" dirty="0"/>
+          </a:p>
+        </p:txBody>
+      </p:sp>
+      <p:sp>
+        <p:nvSpPr>
+          <p:cNvPr id="3" name="Text Placeholder 2"/>
+          <p:cNvSpPr>
+            <a:spLocks noGrp="1"/>
+          </p:cNvSpPr>
+          <p:nvPr>
+            <p:ph type="body" idx="1"/>
+          </p:nvPr>
+        </p:nvSpPr>
+        <p:spPr/>
+        <p:txBody>
+          <a:bodyPr/>
+          <a:lstStyle/>
+          <a:p>
+            <a:pPr marL="0" indent="0">
+              <a:buNone/>
+            </a:pPr>
+            <a:r>
+              <a:rPr lang="en-GB" dirty="0" smtClean="0"/>
+              <a:t>	</a:t>
+            </a:r>
+            <a:endParaRPr lang="en-GB" dirty="0"/>
+          </a:p>
+        </p:txBody>
+      </p:sp>
+    </p:spTree>
+    <p:extLst>
+      <p:ext uri="{BB962C8B-B14F-4D97-AF65-F5344CB8AC3E}">
+        <p14:creationId xmlns:p14="http://schemas.microsoft.com/office/powerpoint/2010/main" val="2948279808"/>
+      </p:ext>
+    </p:extLst>
+  </p:cSld>
+  <p:clrMapOvr>
+    <a:masterClrMapping/>
+  </p:clrMapOvr>
+  <p:transition>
+    <p:fade/>
+  </p:transition>
+  <p:timing>
+    <p:tnLst>
+      <p:par>
+        <p:cTn id="1" dur="indefinite" restart="never" nodeType="tmRoot"/>
+      </p:par>
+    </p:tnLst>
+  </p:timing>
+</p:sld>
+</file>
+
+<file path=ppt/slides/slide14.xml><?xml version="1.0" encoding="utf-8"?>
+<p:sld xmlns:a="http://schemas.openxmlformats.org/drawingml/2006/main" xmlns:r="http://schemas.openxmlformats.org/officeDocument/2006/relationships" xmlns:p="http://schemas.openxmlformats.org/presentationml/2006/main">
+  <p:cSld>
+    <p:spTree>
+      <p:nvGrpSpPr>
+        <p:cNvPr id="1" name=""/>
+        <p:cNvGrpSpPr/>
+        <p:nvPr/>
+      </p:nvGrpSpPr>
+      <p:grpSpPr>
+        <a:xfrm>
+          <a:off x="0" y="0"/>
+          <a:ext cx="0" cy="0"/>
+          <a:chOff x="0" y="0"/>
+          <a:chExt cx="0" cy="0"/>
+        </a:xfrm>
+      </p:grpSpPr>
+      <p:sp>
+        <p:nvSpPr>
+          <p:cNvPr id="2" name="Title 1"/>
+          <p:cNvSpPr>
+            <a:spLocks noGrp="1"/>
+          </p:cNvSpPr>
+          <p:nvPr>
+            <p:ph type="title"/>
+          </p:nvPr>
+        </p:nvSpPr>
+        <p:spPr/>
+        <p:txBody>
+          <a:bodyPr/>
+          <a:lstStyle/>
+          <a:p>
+            <a:r>
+              <a:rPr lang="en-US" dirty="0" smtClean="0"/>
+              <a:t>Summary		</a:t>
+            </a:r>
+            <a:endParaRPr lang="en-GB" dirty="0"/>
+          </a:p>
+        </p:txBody>
+      </p:sp>
+      <p:sp>
+        <p:nvSpPr>
+          <p:cNvPr id="3" name="Text Placeholder 2"/>
+          <p:cNvSpPr>
+            <a:spLocks noGrp="1"/>
+          </p:cNvSpPr>
+          <p:nvPr>
+            <p:ph type="body" idx="1"/>
+          </p:nvPr>
+        </p:nvSpPr>
+        <p:spPr/>
+        <p:txBody>
+          <a:bodyPr/>
+          <a:lstStyle/>
+          <a:p>
+            <a:r>
+              <a:rPr lang="en-US" dirty="0" smtClean="0"/>
+              <a:t>Learned about the Value Binder - Text </a:t>
+            </a:r>
+            <a:r>
+              <a:rPr lang="en-US" dirty="0"/>
+              <a:t>Input </a:t>
+            </a:r>
+            <a:r>
+              <a:rPr lang="en-US" dirty="0" smtClean="0"/>
+              <a:t>Controls</a:t>
+            </a:r>
+            <a:endParaRPr lang="en-US" dirty="0"/>
+          </a:p>
+          <a:p>
+            <a:r>
+              <a:rPr lang="en-GB" dirty="0" smtClean="0"/>
+              <a:t>Learned about the </a:t>
+            </a:r>
+            <a:r>
+              <a:rPr lang="en-GB" dirty="0"/>
+              <a:t>Text Binder </a:t>
+            </a:r>
+            <a:r>
+              <a:rPr lang="en-GB" dirty="0" smtClean="0"/>
+              <a:t>- Text </a:t>
+            </a:r>
+            <a:r>
+              <a:rPr lang="en-GB" dirty="0"/>
+              <a:t>Display </a:t>
+            </a:r>
+            <a:r>
+              <a:rPr lang="en-GB" dirty="0" smtClean="0"/>
+              <a:t>Controls</a:t>
+            </a:r>
+            <a:endParaRPr lang="en-GB" dirty="0"/>
+          </a:p>
+          <a:p>
+            <a:r>
+              <a:rPr lang="en-GB" dirty="0" smtClean="0"/>
+              <a:t>Learned about the </a:t>
+            </a:r>
+            <a:r>
+              <a:rPr lang="en-GB" dirty="0"/>
+              <a:t>Checked Binder </a:t>
+            </a:r>
+            <a:r>
+              <a:rPr lang="en-GB" dirty="0" smtClean="0"/>
+              <a:t> - Checkbox/Radio </a:t>
+            </a:r>
+            <a:r>
+              <a:rPr lang="en-GB" dirty="0"/>
+              <a:t>Button </a:t>
+            </a:r>
+            <a:r>
+              <a:rPr lang="en-GB" dirty="0" smtClean="0"/>
+              <a:t>Controls</a:t>
+            </a:r>
+            <a:endParaRPr lang="en-GB" dirty="0"/>
+          </a:p>
+          <a:p>
+            <a:r>
+              <a:rPr lang="en-GB" dirty="0" smtClean="0"/>
+              <a:t>Learned about the </a:t>
+            </a:r>
+            <a:r>
+              <a:rPr lang="en-GB" dirty="0"/>
+              <a:t>Options Binder </a:t>
+            </a:r>
+            <a:r>
+              <a:rPr lang="en-GB" dirty="0" smtClean="0"/>
+              <a:t>- Selection Controls</a:t>
+            </a:r>
+            <a:endParaRPr lang="en-GB" dirty="0"/>
+          </a:p>
+        </p:txBody>
+      </p:sp>
+    </p:spTree>
+    <p:extLst>
+      <p:ext uri="{BB962C8B-B14F-4D97-AF65-F5344CB8AC3E}">
+        <p14:creationId xmlns:p14="http://schemas.microsoft.com/office/powerpoint/2010/main" val="670543702"/>
+      </p:ext>
+    </p:extLst>
+  </p:cSld>
+  <p:clrMapOvr>
+    <a:masterClrMapping/>
+  </p:clrMapOvr>
+  <p:transition>
+    <p:fade/>
+  </p:transition>
   <p:timing>
     <p:tnLst>
       <p:par>
@@ -7770,7 +8825,7 @@
           <a:p>
             <a:r>
               <a:rPr lang="en-US" dirty="0" smtClean="0"/>
-              <a:t>Summary		</a:t>
+              <a:t>Agenda		</a:t>
             </a:r>
             <a:endParaRPr lang="en-GB" dirty="0"/>
           </a:p>
@@ -7795,53 +8850,31 @@
               <a:rPr lang="en-US" dirty="0" smtClean="0">
                 <a:latin typeface="+mn-lt"/>
               </a:rPr>
-              <a:t>How to leverage our XAML skills for building HTML applications</a:t>
+              <a:t>Text Input Binding - Value Binder</a:t>
+            </a:r>
+          </a:p>
+          <a:p>
+            <a:r>
+              <a:rPr lang="en-GB" dirty="0" smtClean="0">
+                <a:solidFill>
+                  <a:schemeClr val="accent6">
+                    <a:lumMod val="75000"/>
+                  </a:schemeClr>
+                </a:solidFill>
+              </a:rPr>
+              <a:t>Text Display Binding – Text Binder</a:t>
             </a:r>
           </a:p>
           <a:p>
             <a:r>
               <a:rPr lang="en-GB" dirty="0" smtClean="0"/>
-              <a:t>Learned about </a:t>
-            </a:r>
-            <a:r>
-              <a:rPr lang="en-GB" dirty="0"/>
-              <a:t>the tools we are going to </a:t>
-            </a:r>
-            <a:endParaRPr lang="en-GB" dirty="0" smtClean="0"/>
+              <a:t>Checkbox/Radio Button Binding – Checked Binder</a:t>
+            </a:r>
           </a:p>
           <a:p>
             <a:r>
               <a:rPr lang="en-GB" dirty="0" smtClean="0"/>
-              <a:t>Built our </a:t>
-            </a:r>
-            <a:r>
-              <a:rPr lang="en-GB" dirty="0" err="1" smtClean="0"/>
-              <a:t>Asp.Net</a:t>
-            </a:r>
-            <a:r>
-              <a:rPr lang="en-GB" dirty="0" smtClean="0"/>
-              <a:t> </a:t>
-            </a:r>
-            <a:r>
-              <a:rPr lang="en-GB" dirty="0"/>
-              <a:t>MVC t</a:t>
-            </a:r>
-            <a:r>
-              <a:rPr lang="en-GB" dirty="0" smtClean="0"/>
-              <a:t>emplate project</a:t>
-            </a:r>
-            <a:endParaRPr lang="en-GB" dirty="0"/>
-          </a:p>
-          <a:p>
-            <a:r>
-              <a:rPr lang="en-GB" dirty="0" smtClean="0"/>
-              <a:t>Implemented a Hello World  application</a:t>
-            </a:r>
-          </a:p>
-          <a:p>
-            <a:r>
-              <a:rPr lang="en-GB" dirty="0" smtClean="0"/>
-              <a:t>Reviewed our sample applications</a:t>
+              <a:t>Selection Binding – Options Binder</a:t>
             </a:r>
             <a:endParaRPr lang="en-GB" dirty="0"/>
           </a:p>
@@ -7850,7 +8883,104 @@
     </p:spTree>
     <p:extLst>
       <p:ext uri="{BB962C8B-B14F-4D97-AF65-F5344CB8AC3E}">
-        <p14:creationId xmlns:p14="http://schemas.microsoft.com/office/powerpoint/2010/main" val="670543702"/>
+        <p14:creationId xmlns:p14="http://schemas.microsoft.com/office/powerpoint/2010/main" val="2962880706"/>
+      </p:ext>
+    </p:extLst>
+  </p:cSld>
+  <p:clrMapOvr>
+    <a:masterClrMapping/>
+  </p:clrMapOvr>
+  <p:transition>
+    <p:fade/>
+  </p:transition>
+  <p:timing>
+    <p:tnLst>
+      <p:par>
+        <p:cTn id="1" dur="indefinite" restart="never" nodeType="tmRoot"/>
+      </p:par>
+    </p:tnLst>
+  </p:timing>
+</p:sld>
+</file>
+
+<file path=ppt/slides/slide9.xml><?xml version="1.0" encoding="utf-8"?>
+<p:sld xmlns:a="http://schemas.openxmlformats.org/drawingml/2006/main" xmlns:r="http://schemas.openxmlformats.org/officeDocument/2006/relationships" xmlns:p="http://schemas.openxmlformats.org/presentationml/2006/main" show="0">
+  <p:cSld>
+    <p:bg>
+      <p:bgPr>
+        <a:solidFill>
+          <a:schemeClr val="accent2"/>
+        </a:solidFill>
+        <a:effectLst/>
+      </p:bgPr>
+    </p:bg>
+    <p:spTree>
+      <p:nvGrpSpPr>
+        <p:cNvPr id="1" name=""/>
+        <p:cNvGrpSpPr/>
+        <p:nvPr/>
+      </p:nvGrpSpPr>
+      <p:grpSpPr>
+        <a:xfrm>
+          <a:off x="0" y="0"/>
+          <a:ext cx="0" cy="0"/>
+          <a:chOff x="0" y="0"/>
+          <a:chExt cx="0" cy="0"/>
+        </a:xfrm>
+      </p:grpSpPr>
+      <p:sp>
+        <p:nvSpPr>
+          <p:cNvPr id="2" name="Title 1"/>
+          <p:cNvSpPr>
+            <a:spLocks noGrp="1"/>
+          </p:cNvSpPr>
+          <p:nvPr>
+            <p:ph type="title"/>
+          </p:nvPr>
+        </p:nvSpPr>
+        <p:spPr/>
+        <p:txBody>
+          <a:bodyPr/>
+          <a:lstStyle/>
+          <a:p>
+            <a:r>
+              <a:rPr lang="en-US" dirty="0" smtClean="0"/>
+              <a:t>END OF Overview Slides		</a:t>
+            </a:r>
+            <a:endParaRPr lang="en-GB" dirty="0"/>
+          </a:p>
+        </p:txBody>
+      </p:sp>
+      <p:sp>
+        <p:nvSpPr>
+          <p:cNvPr id="3" name="Text Placeholder 2"/>
+          <p:cNvSpPr>
+            <a:spLocks noGrp="1"/>
+          </p:cNvSpPr>
+          <p:nvPr>
+            <p:ph type="body" idx="1"/>
+          </p:nvPr>
+        </p:nvSpPr>
+        <p:spPr/>
+        <p:txBody>
+          <a:bodyPr/>
+          <a:lstStyle/>
+          <a:p>
+            <a:pPr marL="0" indent="0">
+              <a:buNone/>
+            </a:pPr>
+            <a:r>
+              <a:rPr lang="en-GB" dirty="0" smtClean="0"/>
+              <a:t>	</a:t>
+            </a:r>
+            <a:endParaRPr lang="en-GB" dirty="0"/>
+          </a:p>
+        </p:txBody>
+      </p:sp>
+    </p:spTree>
+    <p:extLst>
+      <p:ext uri="{BB962C8B-B14F-4D97-AF65-F5344CB8AC3E}">
+        <p14:creationId xmlns:p14="http://schemas.microsoft.com/office/powerpoint/2010/main" val="1550437736"/>
       </p:ext>
     </p:extLst>
   </p:cSld>

</xml_diff>

<commit_message>
WIP out module 2
</commit_message>
<xml_diff>
--- a/Modules/02.working-with-input-controls/Slides.pptx
+++ b/Modules/02.working-with-input-controls/Slides.pptx
@@ -5,10 +5,10 @@
     <p:sldMasterId id="2147483731" r:id="rId4"/>
   </p:sldMasterIdLst>
   <p:notesMasterIdLst>
-    <p:notesMasterId r:id="rId19"/>
+    <p:notesMasterId r:id="rId21"/>
   </p:notesMasterIdLst>
   <p:handoutMasterIdLst>
-    <p:handoutMasterId r:id="rId20"/>
+    <p:handoutMasterId r:id="rId22"/>
   </p:handoutMasterIdLst>
   <p:sldIdLst>
     <p:sldId id="356" r:id="rId5"/>
@@ -19,12 +19,14 @@
     <p:sldId id="379" r:id="rId10"/>
     <p:sldId id="380" r:id="rId11"/>
     <p:sldId id="381" r:id="rId12"/>
-    <p:sldId id="382" r:id="rId13"/>
-    <p:sldId id="383" r:id="rId14"/>
-    <p:sldId id="384" r:id="rId15"/>
-    <p:sldId id="385" r:id="rId16"/>
-    <p:sldId id="386" r:id="rId17"/>
-    <p:sldId id="378" r:id="rId18"/>
+    <p:sldId id="387" r:id="rId13"/>
+    <p:sldId id="388" r:id="rId14"/>
+    <p:sldId id="382" r:id="rId15"/>
+    <p:sldId id="383" r:id="rId16"/>
+    <p:sldId id="384" r:id="rId17"/>
+    <p:sldId id="385" r:id="rId18"/>
+    <p:sldId id="386" r:id="rId19"/>
+    <p:sldId id="378" r:id="rId20"/>
   </p:sldIdLst>
   <p:sldSz cx="9144000" cy="6858000" type="screen4x3"/>
   <p:notesSz cx="7315200" cy="9601200"/>
@@ -166,6 +168,8 @@
             <p14:sldId id="379"/>
             <p14:sldId id="380"/>
             <p14:sldId id="381"/>
+            <p14:sldId id="387"/>
+            <p14:sldId id="388"/>
             <p14:sldId id="382"/>
             <p14:sldId id="383"/>
             <p14:sldId id="384"/>
@@ -1008,28 +1012,20 @@
               <a:defRPr/>
             </a:pPr>
             <a:fld id="{47C584BF-6945-4E60-B2A7-1638FF8EA8EE}" type="slidenum">
-              <a:rPr lang="en-US" smtClean="0">
-                <a:solidFill>
-                  <a:srgbClr val="000000"/>
-                </a:solidFill>
-              </a:rPr>
+              <a:rPr lang="en-US" smtClean="0"/>
               <a:pPr>
                 <a:defRPr/>
               </a:pPr>
               <a:t>10</a:t>
             </a:fld>
-            <a:endParaRPr lang="en-US">
-              <a:solidFill>
-                <a:srgbClr val="000000"/>
-              </a:solidFill>
-            </a:endParaRPr>
+            <a:endParaRPr lang="en-US"/>
           </a:p>
         </p:txBody>
       </p:sp>
     </p:spTree>
     <p:extLst>
       <p:ext uri="{BB962C8B-B14F-4D97-AF65-F5344CB8AC3E}">
-        <p14:creationId xmlns:p14="http://schemas.microsoft.com/office/powerpoint/2010/main" val="1686684365"/>
+        <p14:creationId xmlns:p14="http://schemas.microsoft.com/office/powerpoint/2010/main" val="1057631775"/>
       </p:ext>
     </p:extLst>
   </p:cSld>
@@ -1127,7 +1123,7 @@
     </p:spTree>
     <p:extLst>
       <p:ext uri="{BB962C8B-B14F-4D97-AF65-F5344CB8AC3E}">
-        <p14:creationId xmlns:p14="http://schemas.microsoft.com/office/powerpoint/2010/main" val="2648717330"/>
+        <p14:creationId xmlns:p14="http://schemas.microsoft.com/office/powerpoint/2010/main" val="3104867663"/>
       </p:ext>
     </p:extLst>
   </p:cSld>
@@ -1225,7 +1221,7 @@
     </p:spTree>
     <p:extLst>
       <p:ext uri="{BB962C8B-B14F-4D97-AF65-F5344CB8AC3E}">
-        <p14:creationId xmlns:p14="http://schemas.microsoft.com/office/powerpoint/2010/main" val="2440829299"/>
+        <p14:creationId xmlns:p14="http://schemas.microsoft.com/office/powerpoint/2010/main" val="1686684365"/>
       </p:ext>
     </p:extLst>
   </p:cSld>
@@ -1323,7 +1319,7 @@
     </p:spTree>
     <p:extLst>
       <p:ext uri="{BB962C8B-B14F-4D97-AF65-F5344CB8AC3E}">
-        <p14:creationId xmlns:p14="http://schemas.microsoft.com/office/powerpoint/2010/main" val="3747604384"/>
+        <p14:creationId xmlns:p14="http://schemas.microsoft.com/office/powerpoint/2010/main" val="2648717330"/>
       </p:ext>
     </p:extLst>
   </p:cSld>
@@ -1400,11 +1396,207 @@
               <a:defRPr/>
             </a:pPr>
             <a:fld id="{47C584BF-6945-4E60-B2A7-1638FF8EA8EE}" type="slidenum">
+              <a:rPr lang="en-US" smtClean="0">
+                <a:solidFill>
+                  <a:srgbClr val="000000"/>
+                </a:solidFill>
+              </a:rPr>
+              <a:pPr>
+                <a:defRPr/>
+              </a:pPr>
+              <a:t>14</a:t>
+            </a:fld>
+            <a:endParaRPr lang="en-US">
+              <a:solidFill>
+                <a:srgbClr val="000000"/>
+              </a:solidFill>
+            </a:endParaRPr>
+          </a:p>
+        </p:txBody>
+      </p:sp>
+    </p:spTree>
+    <p:extLst>
+      <p:ext uri="{BB962C8B-B14F-4D97-AF65-F5344CB8AC3E}">
+        <p14:creationId xmlns:p14="http://schemas.microsoft.com/office/powerpoint/2010/main" val="2440829299"/>
+      </p:ext>
+    </p:extLst>
+  </p:cSld>
+  <p:clrMapOvr>
+    <a:masterClrMapping/>
+  </p:clrMapOvr>
+</p:notes>
+</file>
+
+<file path=ppt/notesSlides/notesSlide15.xml><?xml version="1.0" encoding="utf-8"?>
+<p:notes xmlns:a="http://schemas.openxmlformats.org/drawingml/2006/main" xmlns:r="http://schemas.openxmlformats.org/officeDocument/2006/relationships" xmlns:p="http://schemas.openxmlformats.org/presentationml/2006/main">
+  <p:cSld>
+    <p:spTree>
+      <p:nvGrpSpPr>
+        <p:cNvPr id="1" name=""/>
+        <p:cNvGrpSpPr/>
+        <p:nvPr/>
+      </p:nvGrpSpPr>
+      <p:grpSpPr>
+        <a:xfrm>
+          <a:off x="0" y="0"/>
+          <a:ext cx="0" cy="0"/>
+          <a:chOff x="0" y="0"/>
+          <a:chExt cx="0" cy="0"/>
+        </a:xfrm>
+      </p:grpSpPr>
+      <p:sp>
+        <p:nvSpPr>
+          <p:cNvPr id="2" name="Slide Image Placeholder 1"/>
+          <p:cNvSpPr>
+            <a:spLocks noGrp="1" noRot="1" noChangeAspect="1"/>
+          </p:cNvSpPr>
+          <p:nvPr>
+            <p:ph type="sldImg"/>
+          </p:nvPr>
+        </p:nvSpPr>
+        <p:spPr/>
+      </p:sp>
+      <p:sp>
+        <p:nvSpPr>
+          <p:cNvPr id="3" name="Notes Placeholder 2"/>
+          <p:cNvSpPr>
+            <a:spLocks noGrp="1"/>
+          </p:cNvSpPr>
+          <p:nvPr>
+            <p:ph type="body" idx="1"/>
+          </p:nvPr>
+        </p:nvSpPr>
+        <p:spPr/>
+        <p:txBody>
+          <a:bodyPr/>
+          <a:lstStyle/>
+          <a:p>
+            <a:endParaRPr lang="en-US" dirty="0"/>
+          </a:p>
+        </p:txBody>
+      </p:sp>
+      <p:sp>
+        <p:nvSpPr>
+          <p:cNvPr id="4" name="Slide Number Placeholder 3"/>
+          <p:cNvSpPr>
+            <a:spLocks noGrp="1"/>
+          </p:cNvSpPr>
+          <p:nvPr>
+            <p:ph type="sldNum" sz="quarter" idx="10"/>
+          </p:nvPr>
+        </p:nvSpPr>
+        <p:spPr/>
+        <p:txBody>
+          <a:bodyPr/>
+          <a:lstStyle/>
+          <a:p>
+            <a:pPr>
+              <a:defRPr/>
+            </a:pPr>
+            <a:fld id="{47C584BF-6945-4E60-B2A7-1638FF8EA8EE}" type="slidenum">
+              <a:rPr lang="en-US" smtClean="0">
+                <a:solidFill>
+                  <a:srgbClr val="000000"/>
+                </a:solidFill>
+              </a:rPr>
+              <a:pPr>
+                <a:defRPr/>
+              </a:pPr>
+              <a:t>15</a:t>
+            </a:fld>
+            <a:endParaRPr lang="en-US">
+              <a:solidFill>
+                <a:srgbClr val="000000"/>
+              </a:solidFill>
+            </a:endParaRPr>
+          </a:p>
+        </p:txBody>
+      </p:sp>
+    </p:spTree>
+    <p:extLst>
+      <p:ext uri="{BB962C8B-B14F-4D97-AF65-F5344CB8AC3E}">
+        <p14:creationId xmlns:p14="http://schemas.microsoft.com/office/powerpoint/2010/main" val="3747604384"/>
+      </p:ext>
+    </p:extLst>
+  </p:cSld>
+  <p:clrMapOvr>
+    <a:masterClrMapping/>
+  </p:clrMapOvr>
+</p:notes>
+</file>
+
+<file path=ppt/notesSlides/notesSlide16.xml><?xml version="1.0" encoding="utf-8"?>
+<p:notes xmlns:a="http://schemas.openxmlformats.org/drawingml/2006/main" xmlns:r="http://schemas.openxmlformats.org/officeDocument/2006/relationships" xmlns:p="http://schemas.openxmlformats.org/presentationml/2006/main">
+  <p:cSld>
+    <p:spTree>
+      <p:nvGrpSpPr>
+        <p:cNvPr id="1" name=""/>
+        <p:cNvGrpSpPr/>
+        <p:nvPr/>
+      </p:nvGrpSpPr>
+      <p:grpSpPr>
+        <a:xfrm>
+          <a:off x="0" y="0"/>
+          <a:ext cx="0" cy="0"/>
+          <a:chOff x="0" y="0"/>
+          <a:chExt cx="0" cy="0"/>
+        </a:xfrm>
+      </p:grpSpPr>
+      <p:sp>
+        <p:nvSpPr>
+          <p:cNvPr id="2" name="Slide Image Placeholder 1"/>
+          <p:cNvSpPr>
+            <a:spLocks noGrp="1" noRot="1" noChangeAspect="1"/>
+          </p:cNvSpPr>
+          <p:nvPr>
+            <p:ph type="sldImg"/>
+          </p:nvPr>
+        </p:nvSpPr>
+        <p:spPr/>
+      </p:sp>
+      <p:sp>
+        <p:nvSpPr>
+          <p:cNvPr id="3" name="Notes Placeholder 2"/>
+          <p:cNvSpPr>
+            <a:spLocks noGrp="1"/>
+          </p:cNvSpPr>
+          <p:nvPr>
+            <p:ph type="body" idx="1"/>
+          </p:nvPr>
+        </p:nvSpPr>
+        <p:spPr/>
+        <p:txBody>
+          <a:bodyPr/>
+          <a:lstStyle/>
+          <a:p>
+            <a:endParaRPr lang="en-US" dirty="0"/>
+          </a:p>
+        </p:txBody>
+      </p:sp>
+      <p:sp>
+        <p:nvSpPr>
+          <p:cNvPr id="4" name="Slide Number Placeholder 3"/>
+          <p:cNvSpPr>
+            <a:spLocks noGrp="1"/>
+          </p:cNvSpPr>
+          <p:nvPr>
+            <p:ph type="sldNum" sz="quarter" idx="10"/>
+          </p:nvPr>
+        </p:nvSpPr>
+        <p:spPr/>
+        <p:txBody>
+          <a:bodyPr/>
+          <a:lstStyle/>
+          <a:p>
+            <a:pPr>
+              <a:defRPr/>
+            </a:pPr>
+            <a:fld id="{47C584BF-6945-4E60-B2A7-1638FF8EA8EE}" type="slidenum">
               <a:rPr lang="en-US" smtClean="0"/>
               <a:pPr>
                 <a:defRPr/>
               </a:pPr>
-              <a:t>14</a:t>
+              <a:t>16</a:t>
             </a:fld>
             <a:endParaRPr lang="en-US"/>
           </a:p>
@@ -2128,28 +2320,20 @@
               <a:defRPr/>
             </a:pPr>
             <a:fld id="{47C584BF-6945-4E60-B2A7-1638FF8EA8EE}" type="slidenum">
-              <a:rPr lang="en-US" smtClean="0">
-                <a:solidFill>
-                  <a:srgbClr val="000000"/>
-                </a:solidFill>
-              </a:rPr>
+              <a:rPr lang="en-US" smtClean="0"/>
               <a:pPr>
                 <a:defRPr/>
               </a:pPr>
               <a:t>9</a:t>
             </a:fld>
-            <a:endParaRPr lang="en-US">
-              <a:solidFill>
-                <a:srgbClr val="000000"/>
-              </a:solidFill>
-            </a:endParaRPr>
+            <a:endParaRPr lang="en-US"/>
           </a:p>
         </p:txBody>
       </p:sp>
     </p:spTree>
     <p:extLst>
       <p:ext uri="{BB962C8B-B14F-4D97-AF65-F5344CB8AC3E}">
-        <p14:creationId xmlns:p14="http://schemas.microsoft.com/office/powerpoint/2010/main" val="3104867663"/>
+        <p14:creationId xmlns:p14="http://schemas.microsoft.com/office/powerpoint/2010/main" val="3552603832"/>
       </p:ext>
     </p:extLst>
   </p:cSld>
@@ -3933,6 +4117,30 @@
           <a:chExt cx="0" cy="0"/>
         </a:xfrm>
       </p:grpSpPr>
+      <p:pic>
+        <p:nvPicPr>
+          <p:cNvPr id="5" name="Picture 4"/>
+          <p:cNvPicPr>
+            <a:picLocks noChangeAspect="1"/>
+          </p:cNvPicPr>
+          <p:nvPr/>
+        </p:nvPicPr>
+        <p:blipFill>
+          <a:blip r:embed="rId3"/>
+          <a:stretch>
+            <a:fillRect/>
+          </a:stretch>
+        </p:blipFill>
+        <p:spPr>
+          <a:xfrm>
+            <a:off x="872597" y="1876425"/>
+            <a:ext cx="3667125" cy="819150"/>
+          </a:xfrm>
+          <a:prstGeom prst="rect">
+            <a:avLst/>
+          </a:prstGeom>
+        </p:spPr>
+      </p:pic>
       <p:sp>
         <p:nvSpPr>
           <p:cNvPr id="2" name="Title 1"/>
@@ -3950,65 +4158,530 @@
           <a:p>
             <a:r>
               <a:rPr lang="en-US" dirty="0" smtClean="0"/>
-              <a:t>Agenda		</a:t>
+              <a:t>Text </a:t>
+            </a:r>
+            <a:r>
+              <a:rPr lang="en-US" dirty="0" smtClean="0"/>
+              <a:t>Display </a:t>
+            </a:r>
+            <a:r>
+              <a:rPr lang="en-US" dirty="0" smtClean="0"/>
+              <a:t>Binding – </a:t>
+            </a:r>
+            <a:r>
+              <a:rPr lang="en-US" dirty="0" smtClean="0"/>
+              <a:t>Knockout Way</a:t>
             </a:r>
             <a:endParaRPr lang="en-GB" dirty="0"/>
+          </a:p>
+        </p:txBody>
+      </p:sp>
+      <p:cxnSp>
+        <p:nvCxnSpPr>
+          <p:cNvPr id="7" name="Straight Arrow Connector 6"/>
+          <p:cNvCxnSpPr/>
+          <p:nvPr/>
+        </p:nvCxnSpPr>
+        <p:spPr bwMode="auto">
+          <a:xfrm flipH="1">
+            <a:off x="4876801" y="2267634"/>
+            <a:ext cx="1066799" cy="18366"/>
+          </a:xfrm>
+          <a:prstGeom prst="straightConnector1">
+            <a:avLst/>
+          </a:prstGeom>
+          <a:ln w="63500">
+            <a:solidFill>
+              <a:schemeClr val="tx1"/>
+            </a:solidFill>
+            <a:headEnd type="none" w="med" len="med"/>
+            <a:tailEnd type="triangle"/>
+          </a:ln>
+        </p:spPr>
+        <p:style>
+          <a:lnRef idx="1">
+            <a:schemeClr val="accent2"/>
+          </a:lnRef>
+          <a:fillRef idx="0">
+            <a:schemeClr val="accent2"/>
+          </a:fillRef>
+          <a:effectRef idx="0">
+            <a:schemeClr val="accent2"/>
+          </a:effectRef>
+          <a:fontRef idx="minor">
+            <a:schemeClr val="tx1"/>
+          </a:fontRef>
+        </p:style>
+      </p:cxnSp>
+      <p:sp>
+        <p:nvSpPr>
+          <p:cNvPr id="8" name="TextBox 7"/>
+          <p:cNvSpPr txBox="1"/>
+          <p:nvPr/>
+        </p:nvSpPr>
+        <p:spPr bwMode="auto">
+          <a:xfrm>
+            <a:off x="6070417" y="1944469"/>
+            <a:ext cx="2446311" cy="646331"/>
+          </a:xfrm>
+          <a:prstGeom prst="rect">
+            <a:avLst/>
+          </a:prstGeom>
+          <a:noFill/>
+          <a:ln w="9525">
+            <a:noFill/>
+            <a:miter lim="800000"/>
+            <a:headEnd/>
+            <a:tailEnd/>
+          </a:ln>
+        </p:spPr>
+        <p:txBody>
+          <a:bodyPr wrap="square" rtlCol="0">
+            <a:spAutoFit/>
+          </a:bodyPr>
+          <a:lstStyle/>
+          <a:p>
+            <a:r>
+              <a:rPr lang="en-US" dirty="0" smtClean="0">
+                <a:solidFill>
+                  <a:prstClr val="black"/>
+                </a:solidFill>
+                <a:latin typeface="Myriad Pro"/>
+              </a:rPr>
+              <a:t>Bind to display only controls</a:t>
+            </a:r>
+            <a:endParaRPr lang="en-US" dirty="0">
+              <a:solidFill>
+                <a:prstClr val="black"/>
+              </a:solidFill>
+              <a:latin typeface="Myriad Pro"/>
+            </a:endParaRPr>
           </a:p>
         </p:txBody>
       </p:sp>
       <p:sp>
         <p:nvSpPr>
-          <p:cNvPr id="3" name="Text Placeholder 2"/>
-          <p:cNvSpPr>
-            <a:spLocks noGrp="1"/>
-          </p:cNvSpPr>
-          <p:nvPr>
-            <p:ph type="body" idx="1"/>
-          </p:nvPr>
+          <p:cNvPr id="21" name="TextBox 20"/>
+          <p:cNvSpPr txBox="1"/>
+          <p:nvPr/>
         </p:nvSpPr>
-        <p:spPr/>
+        <p:spPr bwMode="auto">
+          <a:xfrm>
+            <a:off x="816153" y="1267557"/>
+            <a:ext cx="2844983" cy="369332"/>
+          </a:xfrm>
+          <a:prstGeom prst="rect">
+            <a:avLst/>
+          </a:prstGeom>
+          <a:noFill/>
+          <a:ln w="9525">
+            <a:noFill/>
+            <a:miter lim="800000"/>
+            <a:headEnd/>
+            <a:tailEnd/>
+          </a:ln>
+        </p:spPr>
         <p:txBody>
-          <a:bodyPr/>
+          <a:bodyPr wrap="square" rtlCol="0">
+            <a:spAutoFit/>
+          </a:bodyPr>
           <a:lstStyle/>
           <a:p>
             <a:r>
               <a:rPr lang="en-US" dirty="0" smtClean="0">
-                <a:latin typeface="+mn-lt"/>
+                <a:solidFill>
+                  <a:prstClr val="black"/>
+                </a:solidFill>
+                <a:latin typeface="Myriad Pro"/>
               </a:rPr>
-              <a:t>Text Input Binding - Value Binder</a:t>
-            </a:r>
-          </a:p>
-          <a:p>
-            <a:r>
-              <a:rPr lang="en-GB" dirty="0" smtClean="0"/>
-              <a:t>Text Display Binding – Text Binder</a:t>
-            </a:r>
-          </a:p>
-          <a:p>
-            <a:r>
-              <a:rPr lang="en-GB" dirty="0" smtClean="0">
+              <a:t>Basic Binding</a:t>
+            </a:r>
+            <a:endParaRPr lang="en-US" dirty="0">
+              <a:solidFill>
+                <a:prstClr val="black"/>
+              </a:solidFill>
+              <a:latin typeface="Myriad Pro"/>
+            </a:endParaRPr>
+          </a:p>
+        </p:txBody>
+      </p:sp>
+      <p:sp>
+        <p:nvSpPr>
+          <p:cNvPr id="9" name="TextBox 8"/>
+          <p:cNvSpPr txBox="1"/>
+          <p:nvPr/>
+        </p:nvSpPr>
+        <p:spPr bwMode="auto">
+          <a:xfrm>
+            <a:off x="816152" y="3352800"/>
+            <a:ext cx="2844983" cy="369332"/>
+          </a:xfrm>
+          <a:prstGeom prst="rect">
+            <a:avLst/>
+          </a:prstGeom>
+          <a:noFill/>
+          <a:ln w="9525">
+            <a:noFill/>
+            <a:miter lim="800000"/>
+            <a:headEnd/>
+            <a:tailEnd/>
+          </a:ln>
+        </p:spPr>
+        <p:txBody>
+          <a:bodyPr wrap="square" rtlCol="0">
+            <a:spAutoFit/>
+          </a:bodyPr>
+          <a:lstStyle/>
+          <a:p>
+            <a:r>
+              <a:rPr lang="en-US" dirty="0" smtClean="0">
                 <a:solidFill>
-                  <a:schemeClr val="accent6">
-                    <a:lumMod val="75000"/>
-                  </a:schemeClr>
+                  <a:prstClr val="black"/>
                 </a:solidFill>
+                <a:latin typeface="Myriad Pro"/>
               </a:rPr>
-              <a:t>Checkbox/Radio Button Binding – Checked Binder</a:t>
-            </a:r>
-          </a:p>
-          <a:p>
-            <a:r>
-              <a:rPr lang="en-GB" dirty="0" smtClean="0"/>
-              <a:t>Selection Binding – Options Binder</a:t>
-            </a:r>
-            <a:endParaRPr lang="en-GB" dirty="0"/>
+              <a:t>Binding w/out Controls</a:t>
+            </a:r>
+            <a:endParaRPr lang="en-US" dirty="0">
+              <a:solidFill>
+                <a:prstClr val="black"/>
+              </a:solidFill>
+              <a:latin typeface="Myriad Pro"/>
+            </a:endParaRPr>
+          </a:p>
+        </p:txBody>
+      </p:sp>
+      <p:pic>
+        <p:nvPicPr>
+          <p:cNvPr id="6" name="Picture 5"/>
+          <p:cNvPicPr>
+            <a:picLocks noChangeAspect="1"/>
+          </p:cNvPicPr>
+          <p:nvPr/>
+        </p:nvPicPr>
+        <p:blipFill>
+          <a:blip r:embed="rId4"/>
+          <a:stretch>
+            <a:fillRect/>
+          </a:stretch>
+        </p:blipFill>
+        <p:spPr>
+          <a:xfrm>
+            <a:off x="872597" y="3922889"/>
+            <a:ext cx="3752850" cy="495300"/>
+          </a:xfrm>
+          <a:prstGeom prst="rect">
+            <a:avLst/>
+          </a:prstGeom>
+        </p:spPr>
+      </p:pic>
+      <p:cxnSp>
+        <p:nvCxnSpPr>
+          <p:cNvPr id="11" name="Straight Connector 10"/>
+          <p:cNvCxnSpPr/>
+          <p:nvPr/>
+        </p:nvCxnSpPr>
+        <p:spPr bwMode="auto">
+          <a:xfrm>
+            <a:off x="2411771" y="2209800"/>
+            <a:ext cx="1322029" cy="0"/>
+          </a:xfrm>
+          <a:prstGeom prst="line">
+            <a:avLst/>
+          </a:prstGeom>
+          <a:ln>
+            <a:headEnd type="none" w="med" len="med"/>
+            <a:tailEnd type="none" w="med" len="med"/>
+          </a:ln>
+        </p:spPr>
+        <p:style>
+          <a:lnRef idx="3">
+            <a:schemeClr val="accent1"/>
+          </a:lnRef>
+          <a:fillRef idx="0">
+            <a:schemeClr val="accent1"/>
+          </a:fillRef>
+          <a:effectRef idx="2">
+            <a:schemeClr val="accent1"/>
+          </a:effectRef>
+          <a:fontRef idx="minor">
+            <a:schemeClr val="tx1"/>
+          </a:fontRef>
+        </p:style>
+      </p:cxnSp>
+      <p:cxnSp>
+        <p:nvCxnSpPr>
+          <p:cNvPr id="12" name="Straight Connector 11"/>
+          <p:cNvCxnSpPr/>
+          <p:nvPr/>
+        </p:nvCxnSpPr>
+        <p:spPr bwMode="auto">
+          <a:xfrm>
+            <a:off x="1524000" y="4267200"/>
+            <a:ext cx="463363" cy="0"/>
+          </a:xfrm>
+          <a:prstGeom prst="line">
+            <a:avLst/>
+          </a:prstGeom>
+          <a:ln>
+            <a:headEnd type="none" w="med" len="med"/>
+            <a:tailEnd type="none" w="med" len="med"/>
+          </a:ln>
+        </p:spPr>
+        <p:style>
+          <a:lnRef idx="3">
+            <a:schemeClr val="accent1"/>
+          </a:lnRef>
+          <a:fillRef idx="0">
+            <a:schemeClr val="accent1"/>
+          </a:fillRef>
+          <a:effectRef idx="2">
+            <a:schemeClr val="accent1"/>
+          </a:effectRef>
+          <a:fontRef idx="minor">
+            <a:schemeClr val="tx1"/>
+          </a:fontRef>
+        </p:style>
+      </p:cxnSp>
+      <p:cxnSp>
+        <p:nvCxnSpPr>
+          <p:cNvPr id="13" name="Straight Connector 12"/>
+          <p:cNvCxnSpPr/>
+          <p:nvPr/>
+        </p:nvCxnSpPr>
+        <p:spPr bwMode="auto">
+          <a:xfrm>
+            <a:off x="3880037" y="4267200"/>
+            <a:ext cx="463363" cy="0"/>
+          </a:xfrm>
+          <a:prstGeom prst="line">
+            <a:avLst/>
+          </a:prstGeom>
+          <a:ln>
+            <a:headEnd type="none" w="med" len="med"/>
+            <a:tailEnd type="none" w="med" len="med"/>
+          </a:ln>
+        </p:spPr>
+        <p:style>
+          <a:lnRef idx="3">
+            <a:schemeClr val="accent1"/>
+          </a:lnRef>
+          <a:fillRef idx="0">
+            <a:schemeClr val="accent1"/>
+          </a:fillRef>
+          <a:effectRef idx="2">
+            <a:schemeClr val="accent1"/>
+          </a:effectRef>
+          <a:fontRef idx="minor">
+            <a:schemeClr val="tx1"/>
+          </a:fontRef>
+        </p:style>
+      </p:cxnSp>
+      <p:cxnSp>
+        <p:nvCxnSpPr>
+          <p:cNvPr id="14" name="Straight Connector 13"/>
+          <p:cNvCxnSpPr/>
+          <p:nvPr/>
+        </p:nvCxnSpPr>
+        <p:spPr bwMode="auto">
+          <a:xfrm>
+            <a:off x="2133600" y="4267200"/>
+            <a:ext cx="1322030" cy="0"/>
+          </a:xfrm>
+          <a:prstGeom prst="line">
+            <a:avLst/>
+          </a:prstGeom>
+          <a:ln>
+            <a:headEnd type="none" w="med" len="med"/>
+            <a:tailEnd type="none" w="med" len="med"/>
+          </a:ln>
+        </p:spPr>
+        <p:style>
+          <a:lnRef idx="3">
+            <a:schemeClr val="accent1"/>
+          </a:lnRef>
+          <a:fillRef idx="0">
+            <a:schemeClr val="accent1"/>
+          </a:fillRef>
+          <a:effectRef idx="2">
+            <a:schemeClr val="accent1"/>
+          </a:effectRef>
+          <a:fontRef idx="minor">
+            <a:schemeClr val="tx1"/>
+          </a:fontRef>
+        </p:style>
+      </p:cxnSp>
+      <p:cxnSp>
+        <p:nvCxnSpPr>
+          <p:cNvPr id="15" name="Straight Arrow Connector 14"/>
+          <p:cNvCxnSpPr/>
+          <p:nvPr/>
+        </p:nvCxnSpPr>
+        <p:spPr bwMode="auto">
+          <a:xfrm flipH="1">
+            <a:off x="4876800" y="4172634"/>
+            <a:ext cx="1066799" cy="18366"/>
+          </a:xfrm>
+          <a:prstGeom prst="straightConnector1">
+            <a:avLst/>
+          </a:prstGeom>
+          <a:ln w="63500">
+            <a:solidFill>
+              <a:schemeClr val="tx1"/>
+            </a:solidFill>
+            <a:headEnd type="none" w="med" len="med"/>
+            <a:tailEnd type="triangle"/>
+          </a:ln>
+        </p:spPr>
+        <p:style>
+          <a:lnRef idx="1">
+            <a:schemeClr val="accent2"/>
+          </a:lnRef>
+          <a:fillRef idx="0">
+            <a:schemeClr val="accent2"/>
+          </a:fillRef>
+          <a:effectRef idx="0">
+            <a:schemeClr val="accent2"/>
+          </a:effectRef>
+          <a:fontRef idx="minor">
+            <a:schemeClr val="tx1"/>
+          </a:fontRef>
+        </p:style>
+      </p:cxnSp>
+      <p:sp>
+        <p:nvSpPr>
+          <p:cNvPr id="16" name="TextBox 15"/>
+          <p:cNvSpPr txBox="1"/>
+          <p:nvPr/>
+        </p:nvSpPr>
+        <p:spPr bwMode="auto">
+          <a:xfrm>
+            <a:off x="6070416" y="3849469"/>
+            <a:ext cx="2446311" cy="646331"/>
+          </a:xfrm>
+          <a:prstGeom prst="rect">
+            <a:avLst/>
+          </a:prstGeom>
+          <a:noFill/>
+          <a:ln w="9525">
+            <a:noFill/>
+            <a:miter lim="800000"/>
+            <a:headEnd/>
+            <a:tailEnd/>
+          </a:ln>
+        </p:spPr>
+        <p:txBody>
+          <a:bodyPr wrap="square" rtlCol="0">
+            <a:spAutoFit/>
+          </a:bodyPr>
+          <a:lstStyle/>
+          <a:p>
+            <a:r>
+              <a:rPr lang="en-US" dirty="0" smtClean="0">
+                <a:solidFill>
+                  <a:prstClr val="black"/>
+                </a:solidFill>
+                <a:latin typeface="Myriad Pro"/>
+              </a:rPr>
+              <a:t>Bind directly to unformatted text</a:t>
+            </a:r>
+            <a:endParaRPr lang="en-US" dirty="0">
+              <a:solidFill>
+                <a:prstClr val="black"/>
+              </a:solidFill>
+              <a:latin typeface="Myriad Pro"/>
+            </a:endParaRPr>
+          </a:p>
+        </p:txBody>
+      </p:sp>
+      <p:cxnSp>
+        <p:nvCxnSpPr>
+          <p:cNvPr id="17" name="Straight Arrow Connector 16"/>
+          <p:cNvCxnSpPr/>
+          <p:nvPr/>
+        </p:nvCxnSpPr>
+        <p:spPr bwMode="auto">
+          <a:xfrm flipV="1">
+            <a:off x="2943891" y="4572000"/>
+            <a:ext cx="0" cy="630653"/>
+          </a:xfrm>
+          <a:prstGeom prst="straightConnector1">
+            <a:avLst/>
+          </a:prstGeom>
+          <a:ln w="63500">
+            <a:solidFill>
+              <a:schemeClr val="tx1"/>
+            </a:solidFill>
+            <a:headEnd type="none" w="med" len="med"/>
+            <a:tailEnd type="triangle"/>
+          </a:ln>
+        </p:spPr>
+        <p:style>
+          <a:lnRef idx="1">
+            <a:schemeClr val="accent2"/>
+          </a:lnRef>
+          <a:fillRef idx="0">
+            <a:schemeClr val="accent2"/>
+          </a:fillRef>
+          <a:effectRef idx="0">
+            <a:schemeClr val="accent2"/>
+          </a:effectRef>
+          <a:fontRef idx="minor">
+            <a:schemeClr val="tx1"/>
+          </a:fontRef>
+        </p:style>
+      </p:cxnSp>
+      <p:sp>
+        <p:nvSpPr>
+          <p:cNvPr id="18" name="TextBox 17"/>
+          <p:cNvSpPr txBox="1"/>
+          <p:nvPr/>
+        </p:nvSpPr>
+        <p:spPr bwMode="auto">
+          <a:xfrm>
+            <a:off x="1755681" y="5366998"/>
+            <a:ext cx="2446311" cy="369332"/>
+          </a:xfrm>
+          <a:prstGeom prst="rect">
+            <a:avLst/>
+          </a:prstGeom>
+          <a:noFill/>
+          <a:ln w="9525">
+            <a:noFill/>
+            <a:miter lim="800000"/>
+            <a:headEnd/>
+            <a:tailEnd/>
+          </a:ln>
+        </p:spPr>
+        <p:txBody>
+          <a:bodyPr wrap="square" rtlCol="0">
+            <a:spAutoFit/>
+          </a:bodyPr>
+          <a:lstStyle/>
+          <a:p>
+            <a:pPr algn="ctr"/>
+            <a:r>
+              <a:rPr lang="en-US" dirty="0" smtClean="0">
+                <a:solidFill>
+                  <a:prstClr val="black"/>
+                </a:solidFill>
+                <a:latin typeface="Myriad Pro"/>
+              </a:rPr>
+              <a:t>Standard Text Binder</a:t>
+            </a:r>
+            <a:endParaRPr lang="en-US" dirty="0">
+              <a:solidFill>
+                <a:prstClr val="black"/>
+              </a:solidFill>
+              <a:latin typeface="Myriad Pro"/>
+            </a:endParaRPr>
           </a:p>
         </p:txBody>
       </p:sp>
     </p:spTree>
     <p:extLst>
       <p:ext uri="{BB962C8B-B14F-4D97-AF65-F5344CB8AC3E}">
-        <p14:creationId xmlns:p14="http://schemas.microsoft.com/office/powerpoint/2010/main" val="512638731"/>
+        <p14:creationId xmlns:p14="http://schemas.microsoft.com/office/powerpoint/2010/main" val="2550738104"/>
       </p:ext>
     </p:extLst>
   </p:cSld>
@@ -4021,9 +4694,684 @@
   <p:timing>
     <p:tnLst>
       <p:par>
-        <p:cTn id="1" dur="indefinite" restart="never" nodeType="tmRoot"/>
+        <p:cTn id="1" dur="indefinite" restart="never" nodeType="tmRoot">
+          <p:childTnLst>
+            <p:seq concurrent="1" nextAc="seek">
+              <p:cTn id="2" dur="indefinite" nodeType="mainSeq">
+                <p:childTnLst>
+                  <p:par>
+                    <p:cTn id="3" fill="hold">
+                      <p:stCondLst>
+                        <p:cond delay="indefinite"/>
+                        <p:cond evt="onBegin" delay="0">
+                          <p:tn val="2"/>
+                        </p:cond>
+                      </p:stCondLst>
+                      <p:childTnLst>
+                        <p:par>
+                          <p:cTn id="4" fill="hold">
+                            <p:stCondLst>
+                              <p:cond delay="0"/>
+                            </p:stCondLst>
+                            <p:childTnLst>
+                              <p:par>
+                                <p:cTn id="5" presetID="1" presetClass="entr" presetSubtype="0" fill="hold" nodeType="withEffect">
+                                  <p:stCondLst>
+                                    <p:cond delay="0"/>
+                                  </p:stCondLst>
+                                  <p:childTnLst>
+                                    <p:set>
+                                      <p:cBhvr>
+                                        <p:cTn id="6" dur="1" fill="hold">
+                                          <p:stCondLst>
+                                            <p:cond delay="0"/>
+                                          </p:stCondLst>
+                                        </p:cTn>
+                                        <p:tgtEl>
+                                          <p:spTgt spid="5"/>
+                                        </p:tgtEl>
+                                        <p:attrNameLst>
+                                          <p:attrName>style.visibility</p:attrName>
+                                        </p:attrNameLst>
+                                      </p:cBhvr>
+                                      <p:to>
+                                        <p:strVal val="visible"/>
+                                      </p:to>
+                                    </p:set>
+                                  </p:childTnLst>
+                                </p:cTn>
+                              </p:par>
+                              <p:par>
+                                <p:cTn id="7" presetID="1" presetClass="entr" presetSubtype="0" fill="hold" grpId="0" nodeType="withEffect">
+                                  <p:stCondLst>
+                                    <p:cond delay="0"/>
+                                  </p:stCondLst>
+                                  <p:childTnLst>
+                                    <p:set>
+                                      <p:cBhvr>
+                                        <p:cTn id="8" dur="1" fill="hold">
+                                          <p:stCondLst>
+                                            <p:cond delay="0"/>
+                                          </p:stCondLst>
+                                        </p:cTn>
+                                        <p:tgtEl>
+                                          <p:spTgt spid="21"/>
+                                        </p:tgtEl>
+                                        <p:attrNameLst>
+                                          <p:attrName>style.visibility</p:attrName>
+                                        </p:attrNameLst>
+                                      </p:cBhvr>
+                                      <p:to>
+                                        <p:strVal val="visible"/>
+                                      </p:to>
+                                    </p:set>
+                                  </p:childTnLst>
+                                </p:cTn>
+                              </p:par>
+                            </p:childTnLst>
+                          </p:cTn>
+                        </p:par>
+                      </p:childTnLst>
+                    </p:cTn>
+                  </p:par>
+                  <p:par>
+                    <p:cTn id="9" fill="hold">
+                      <p:stCondLst>
+                        <p:cond delay="indefinite"/>
+                      </p:stCondLst>
+                      <p:childTnLst>
+                        <p:par>
+                          <p:cTn id="10" fill="hold">
+                            <p:stCondLst>
+                              <p:cond delay="0"/>
+                            </p:stCondLst>
+                            <p:childTnLst>
+                              <p:par>
+                                <p:cTn id="11" presetID="1" presetClass="entr" presetSubtype="0" fill="hold" nodeType="clickEffect">
+                                  <p:stCondLst>
+                                    <p:cond delay="0"/>
+                                  </p:stCondLst>
+                                  <p:childTnLst>
+                                    <p:set>
+                                      <p:cBhvr>
+                                        <p:cTn id="12" dur="1" fill="hold">
+                                          <p:stCondLst>
+                                            <p:cond delay="0"/>
+                                          </p:stCondLst>
+                                        </p:cTn>
+                                        <p:tgtEl>
+                                          <p:spTgt spid="11"/>
+                                        </p:tgtEl>
+                                        <p:attrNameLst>
+                                          <p:attrName>style.visibility</p:attrName>
+                                        </p:attrNameLst>
+                                      </p:cBhvr>
+                                      <p:to>
+                                        <p:strVal val="visible"/>
+                                      </p:to>
+                                    </p:set>
+                                  </p:childTnLst>
+                                </p:cTn>
+                              </p:par>
+                              <p:par>
+                                <p:cTn id="13" presetID="1" presetClass="entr" presetSubtype="0" fill="hold" nodeType="withEffect">
+                                  <p:stCondLst>
+                                    <p:cond delay="0"/>
+                                  </p:stCondLst>
+                                  <p:childTnLst>
+                                    <p:set>
+                                      <p:cBhvr>
+                                        <p:cTn id="14" dur="1" fill="hold">
+                                          <p:stCondLst>
+                                            <p:cond delay="0"/>
+                                          </p:stCondLst>
+                                        </p:cTn>
+                                        <p:tgtEl>
+                                          <p:spTgt spid="7"/>
+                                        </p:tgtEl>
+                                        <p:attrNameLst>
+                                          <p:attrName>style.visibility</p:attrName>
+                                        </p:attrNameLst>
+                                      </p:cBhvr>
+                                      <p:to>
+                                        <p:strVal val="visible"/>
+                                      </p:to>
+                                    </p:set>
+                                  </p:childTnLst>
+                                </p:cTn>
+                              </p:par>
+                              <p:par>
+                                <p:cTn id="15" presetID="1" presetClass="entr" presetSubtype="0" fill="hold" grpId="0" nodeType="withEffect">
+                                  <p:stCondLst>
+                                    <p:cond delay="0"/>
+                                  </p:stCondLst>
+                                  <p:childTnLst>
+                                    <p:set>
+                                      <p:cBhvr>
+                                        <p:cTn id="16" dur="1" fill="hold">
+                                          <p:stCondLst>
+                                            <p:cond delay="0"/>
+                                          </p:stCondLst>
+                                        </p:cTn>
+                                        <p:tgtEl>
+                                          <p:spTgt spid="8"/>
+                                        </p:tgtEl>
+                                        <p:attrNameLst>
+                                          <p:attrName>style.visibility</p:attrName>
+                                        </p:attrNameLst>
+                                      </p:cBhvr>
+                                      <p:to>
+                                        <p:strVal val="visible"/>
+                                      </p:to>
+                                    </p:set>
+                                  </p:childTnLst>
+                                </p:cTn>
+                              </p:par>
+                            </p:childTnLst>
+                          </p:cTn>
+                        </p:par>
+                      </p:childTnLst>
+                    </p:cTn>
+                  </p:par>
+                  <p:par>
+                    <p:cTn id="17" fill="hold">
+                      <p:stCondLst>
+                        <p:cond delay="indefinite"/>
+                      </p:stCondLst>
+                      <p:childTnLst>
+                        <p:par>
+                          <p:cTn id="18" fill="hold">
+                            <p:stCondLst>
+                              <p:cond delay="0"/>
+                            </p:stCondLst>
+                            <p:childTnLst>
+                              <p:par>
+                                <p:cTn id="19" presetID="1" presetClass="entr" presetSubtype="0" fill="hold" nodeType="clickEffect">
+                                  <p:stCondLst>
+                                    <p:cond delay="0"/>
+                                  </p:stCondLst>
+                                  <p:childTnLst>
+                                    <p:set>
+                                      <p:cBhvr>
+                                        <p:cTn id="20" dur="1" fill="hold">
+                                          <p:stCondLst>
+                                            <p:cond delay="0"/>
+                                          </p:stCondLst>
+                                        </p:cTn>
+                                        <p:tgtEl>
+                                          <p:spTgt spid="12"/>
+                                        </p:tgtEl>
+                                        <p:attrNameLst>
+                                          <p:attrName>style.visibility</p:attrName>
+                                        </p:attrNameLst>
+                                      </p:cBhvr>
+                                      <p:to>
+                                        <p:strVal val="visible"/>
+                                      </p:to>
+                                    </p:set>
+                                  </p:childTnLst>
+                                </p:cTn>
+                              </p:par>
+                              <p:par>
+                                <p:cTn id="21" presetID="1" presetClass="entr" presetSubtype="0" fill="hold" nodeType="withEffect">
+                                  <p:stCondLst>
+                                    <p:cond delay="0"/>
+                                  </p:stCondLst>
+                                  <p:childTnLst>
+                                    <p:set>
+                                      <p:cBhvr>
+                                        <p:cTn id="22" dur="1" fill="hold">
+                                          <p:stCondLst>
+                                            <p:cond delay="0"/>
+                                          </p:stCondLst>
+                                        </p:cTn>
+                                        <p:tgtEl>
+                                          <p:spTgt spid="13"/>
+                                        </p:tgtEl>
+                                        <p:attrNameLst>
+                                          <p:attrName>style.visibility</p:attrName>
+                                        </p:attrNameLst>
+                                      </p:cBhvr>
+                                      <p:to>
+                                        <p:strVal val="visible"/>
+                                      </p:to>
+                                    </p:set>
+                                  </p:childTnLst>
+                                </p:cTn>
+                              </p:par>
+                              <p:par>
+                                <p:cTn id="23" presetID="1" presetClass="entr" presetSubtype="0" fill="hold" nodeType="withEffect">
+                                  <p:stCondLst>
+                                    <p:cond delay="0"/>
+                                  </p:stCondLst>
+                                  <p:childTnLst>
+                                    <p:set>
+                                      <p:cBhvr>
+                                        <p:cTn id="24" dur="1" fill="hold">
+                                          <p:stCondLst>
+                                            <p:cond delay="0"/>
+                                          </p:stCondLst>
+                                        </p:cTn>
+                                        <p:tgtEl>
+                                          <p:spTgt spid="15"/>
+                                        </p:tgtEl>
+                                        <p:attrNameLst>
+                                          <p:attrName>style.visibility</p:attrName>
+                                        </p:attrNameLst>
+                                      </p:cBhvr>
+                                      <p:to>
+                                        <p:strVal val="visible"/>
+                                      </p:to>
+                                    </p:set>
+                                  </p:childTnLst>
+                                </p:cTn>
+                              </p:par>
+                              <p:par>
+                                <p:cTn id="25" presetID="1" presetClass="entr" presetSubtype="0" fill="hold" grpId="0" nodeType="withEffect">
+                                  <p:stCondLst>
+                                    <p:cond delay="0"/>
+                                  </p:stCondLst>
+                                  <p:childTnLst>
+                                    <p:set>
+                                      <p:cBhvr>
+                                        <p:cTn id="26" dur="1" fill="hold">
+                                          <p:stCondLst>
+                                            <p:cond delay="0"/>
+                                          </p:stCondLst>
+                                        </p:cTn>
+                                        <p:tgtEl>
+                                          <p:spTgt spid="16"/>
+                                        </p:tgtEl>
+                                        <p:attrNameLst>
+                                          <p:attrName>style.visibility</p:attrName>
+                                        </p:attrNameLst>
+                                      </p:cBhvr>
+                                      <p:to>
+                                        <p:strVal val="visible"/>
+                                      </p:to>
+                                    </p:set>
+                                  </p:childTnLst>
+                                </p:cTn>
+                              </p:par>
+                              <p:par>
+                                <p:cTn id="27" presetID="10" presetClass="exit" presetSubtype="0" fill="hold" nodeType="withEffect">
+                                  <p:stCondLst>
+                                    <p:cond delay="0"/>
+                                  </p:stCondLst>
+                                  <p:childTnLst>
+                                    <p:animEffect transition="out" filter="fade">
+                                      <p:cBhvr>
+                                        <p:cTn id="28" dur="500"/>
+                                        <p:tgtEl>
+                                          <p:spTgt spid="11"/>
+                                        </p:tgtEl>
+                                      </p:cBhvr>
+                                    </p:animEffect>
+                                    <p:set>
+                                      <p:cBhvr>
+                                        <p:cTn id="29" dur="1" fill="hold">
+                                          <p:stCondLst>
+                                            <p:cond delay="499"/>
+                                          </p:stCondLst>
+                                        </p:cTn>
+                                        <p:tgtEl>
+                                          <p:spTgt spid="11"/>
+                                        </p:tgtEl>
+                                        <p:attrNameLst>
+                                          <p:attrName>style.visibility</p:attrName>
+                                        </p:attrNameLst>
+                                      </p:cBhvr>
+                                      <p:to>
+                                        <p:strVal val="hidden"/>
+                                      </p:to>
+                                    </p:set>
+                                  </p:childTnLst>
+                                </p:cTn>
+                              </p:par>
+                              <p:par>
+                                <p:cTn id="30" presetID="10" presetClass="exit" presetSubtype="0" fill="hold" nodeType="withEffect">
+                                  <p:stCondLst>
+                                    <p:cond delay="0"/>
+                                  </p:stCondLst>
+                                  <p:childTnLst>
+                                    <p:animEffect transition="out" filter="fade">
+                                      <p:cBhvr>
+                                        <p:cTn id="31" dur="500"/>
+                                        <p:tgtEl>
+                                          <p:spTgt spid="7"/>
+                                        </p:tgtEl>
+                                      </p:cBhvr>
+                                    </p:animEffect>
+                                    <p:set>
+                                      <p:cBhvr>
+                                        <p:cTn id="32" dur="1" fill="hold">
+                                          <p:stCondLst>
+                                            <p:cond delay="499"/>
+                                          </p:stCondLst>
+                                        </p:cTn>
+                                        <p:tgtEl>
+                                          <p:spTgt spid="7"/>
+                                        </p:tgtEl>
+                                        <p:attrNameLst>
+                                          <p:attrName>style.visibility</p:attrName>
+                                        </p:attrNameLst>
+                                      </p:cBhvr>
+                                      <p:to>
+                                        <p:strVal val="hidden"/>
+                                      </p:to>
+                                    </p:set>
+                                  </p:childTnLst>
+                                </p:cTn>
+                              </p:par>
+                              <p:par>
+                                <p:cTn id="33" presetID="10" presetClass="exit" presetSubtype="0" fill="hold" grpId="1" nodeType="withEffect">
+                                  <p:stCondLst>
+                                    <p:cond delay="0"/>
+                                  </p:stCondLst>
+                                  <p:childTnLst>
+                                    <p:animEffect transition="out" filter="fade">
+                                      <p:cBhvr>
+                                        <p:cTn id="34" dur="500"/>
+                                        <p:tgtEl>
+                                          <p:spTgt spid="8"/>
+                                        </p:tgtEl>
+                                      </p:cBhvr>
+                                    </p:animEffect>
+                                    <p:set>
+                                      <p:cBhvr>
+                                        <p:cTn id="35" dur="1" fill="hold">
+                                          <p:stCondLst>
+                                            <p:cond delay="499"/>
+                                          </p:stCondLst>
+                                        </p:cTn>
+                                        <p:tgtEl>
+                                          <p:spTgt spid="8"/>
+                                        </p:tgtEl>
+                                        <p:attrNameLst>
+                                          <p:attrName>style.visibility</p:attrName>
+                                        </p:attrNameLst>
+                                      </p:cBhvr>
+                                      <p:to>
+                                        <p:strVal val="hidden"/>
+                                      </p:to>
+                                    </p:set>
+                                  </p:childTnLst>
+                                </p:cTn>
+                              </p:par>
+                            </p:childTnLst>
+                          </p:cTn>
+                        </p:par>
+                      </p:childTnLst>
+                    </p:cTn>
+                  </p:par>
+                  <p:par>
+                    <p:cTn id="36" fill="hold">
+                      <p:stCondLst>
+                        <p:cond delay="indefinite"/>
+                      </p:stCondLst>
+                      <p:childTnLst>
+                        <p:par>
+                          <p:cTn id="37" fill="hold">
+                            <p:stCondLst>
+                              <p:cond delay="0"/>
+                            </p:stCondLst>
+                            <p:childTnLst>
+                              <p:par>
+                                <p:cTn id="38" presetID="1" presetClass="entr" presetSubtype="0" fill="hold" nodeType="clickEffect">
+                                  <p:stCondLst>
+                                    <p:cond delay="0"/>
+                                  </p:stCondLst>
+                                  <p:childTnLst>
+                                    <p:set>
+                                      <p:cBhvr>
+                                        <p:cTn id="39" dur="1" fill="hold">
+                                          <p:stCondLst>
+                                            <p:cond delay="0"/>
+                                          </p:stCondLst>
+                                        </p:cTn>
+                                        <p:tgtEl>
+                                          <p:spTgt spid="14"/>
+                                        </p:tgtEl>
+                                        <p:attrNameLst>
+                                          <p:attrName>style.visibility</p:attrName>
+                                        </p:attrNameLst>
+                                      </p:cBhvr>
+                                      <p:to>
+                                        <p:strVal val="visible"/>
+                                      </p:to>
+                                    </p:set>
+                                  </p:childTnLst>
+                                </p:cTn>
+                              </p:par>
+                              <p:par>
+                                <p:cTn id="40" presetID="1" presetClass="entr" presetSubtype="0" fill="hold" nodeType="withEffect">
+                                  <p:stCondLst>
+                                    <p:cond delay="0"/>
+                                  </p:stCondLst>
+                                  <p:childTnLst>
+                                    <p:set>
+                                      <p:cBhvr>
+                                        <p:cTn id="41" dur="1" fill="hold">
+                                          <p:stCondLst>
+                                            <p:cond delay="0"/>
+                                          </p:stCondLst>
+                                        </p:cTn>
+                                        <p:tgtEl>
+                                          <p:spTgt spid="17"/>
+                                        </p:tgtEl>
+                                        <p:attrNameLst>
+                                          <p:attrName>style.visibility</p:attrName>
+                                        </p:attrNameLst>
+                                      </p:cBhvr>
+                                      <p:to>
+                                        <p:strVal val="visible"/>
+                                      </p:to>
+                                    </p:set>
+                                  </p:childTnLst>
+                                </p:cTn>
+                              </p:par>
+                              <p:par>
+                                <p:cTn id="42" presetID="1" presetClass="entr" presetSubtype="0" fill="hold" grpId="0" nodeType="withEffect">
+                                  <p:stCondLst>
+                                    <p:cond delay="0"/>
+                                  </p:stCondLst>
+                                  <p:childTnLst>
+                                    <p:set>
+                                      <p:cBhvr>
+                                        <p:cTn id="43" dur="1" fill="hold">
+                                          <p:stCondLst>
+                                            <p:cond delay="0"/>
+                                          </p:stCondLst>
+                                        </p:cTn>
+                                        <p:tgtEl>
+                                          <p:spTgt spid="18"/>
+                                        </p:tgtEl>
+                                        <p:attrNameLst>
+                                          <p:attrName>style.visibility</p:attrName>
+                                        </p:attrNameLst>
+                                      </p:cBhvr>
+                                      <p:to>
+                                        <p:strVal val="visible"/>
+                                      </p:to>
+                                    </p:set>
+                                  </p:childTnLst>
+                                </p:cTn>
+                              </p:par>
+                              <p:par>
+                                <p:cTn id="44" presetID="10" presetClass="exit" presetSubtype="0" fill="hold" nodeType="withEffect">
+                                  <p:stCondLst>
+                                    <p:cond delay="0"/>
+                                  </p:stCondLst>
+                                  <p:childTnLst>
+                                    <p:animEffect transition="out" filter="fade">
+                                      <p:cBhvr>
+                                        <p:cTn id="45" dur="500"/>
+                                        <p:tgtEl>
+                                          <p:spTgt spid="12"/>
+                                        </p:tgtEl>
+                                      </p:cBhvr>
+                                    </p:animEffect>
+                                    <p:set>
+                                      <p:cBhvr>
+                                        <p:cTn id="46" dur="1" fill="hold">
+                                          <p:stCondLst>
+                                            <p:cond delay="499"/>
+                                          </p:stCondLst>
+                                        </p:cTn>
+                                        <p:tgtEl>
+                                          <p:spTgt spid="12"/>
+                                        </p:tgtEl>
+                                        <p:attrNameLst>
+                                          <p:attrName>style.visibility</p:attrName>
+                                        </p:attrNameLst>
+                                      </p:cBhvr>
+                                      <p:to>
+                                        <p:strVal val="hidden"/>
+                                      </p:to>
+                                    </p:set>
+                                  </p:childTnLst>
+                                </p:cTn>
+                              </p:par>
+                              <p:par>
+                                <p:cTn id="47" presetID="10" presetClass="exit" presetSubtype="0" fill="hold" nodeType="withEffect">
+                                  <p:stCondLst>
+                                    <p:cond delay="0"/>
+                                  </p:stCondLst>
+                                  <p:childTnLst>
+                                    <p:animEffect transition="out" filter="fade">
+                                      <p:cBhvr>
+                                        <p:cTn id="48" dur="500"/>
+                                        <p:tgtEl>
+                                          <p:spTgt spid="13"/>
+                                        </p:tgtEl>
+                                      </p:cBhvr>
+                                    </p:animEffect>
+                                    <p:set>
+                                      <p:cBhvr>
+                                        <p:cTn id="49" dur="1" fill="hold">
+                                          <p:stCondLst>
+                                            <p:cond delay="499"/>
+                                          </p:stCondLst>
+                                        </p:cTn>
+                                        <p:tgtEl>
+                                          <p:spTgt spid="13"/>
+                                        </p:tgtEl>
+                                        <p:attrNameLst>
+                                          <p:attrName>style.visibility</p:attrName>
+                                        </p:attrNameLst>
+                                      </p:cBhvr>
+                                      <p:to>
+                                        <p:strVal val="hidden"/>
+                                      </p:to>
+                                    </p:set>
+                                  </p:childTnLst>
+                                </p:cTn>
+                              </p:par>
+                              <p:par>
+                                <p:cTn id="50" presetID="10" presetClass="exit" presetSubtype="0" fill="hold" nodeType="withEffect">
+                                  <p:stCondLst>
+                                    <p:cond delay="0"/>
+                                  </p:stCondLst>
+                                  <p:childTnLst>
+                                    <p:animEffect transition="out" filter="fade">
+                                      <p:cBhvr>
+                                        <p:cTn id="51" dur="500"/>
+                                        <p:tgtEl>
+                                          <p:spTgt spid="15"/>
+                                        </p:tgtEl>
+                                      </p:cBhvr>
+                                    </p:animEffect>
+                                    <p:set>
+                                      <p:cBhvr>
+                                        <p:cTn id="52" dur="1" fill="hold">
+                                          <p:stCondLst>
+                                            <p:cond delay="499"/>
+                                          </p:stCondLst>
+                                        </p:cTn>
+                                        <p:tgtEl>
+                                          <p:spTgt spid="15"/>
+                                        </p:tgtEl>
+                                        <p:attrNameLst>
+                                          <p:attrName>style.visibility</p:attrName>
+                                        </p:attrNameLst>
+                                      </p:cBhvr>
+                                      <p:to>
+                                        <p:strVal val="hidden"/>
+                                      </p:to>
+                                    </p:set>
+                                  </p:childTnLst>
+                                </p:cTn>
+                              </p:par>
+                              <p:par>
+                                <p:cTn id="53" presetID="10" presetClass="exit" presetSubtype="0" fill="hold" grpId="1" nodeType="withEffect">
+                                  <p:stCondLst>
+                                    <p:cond delay="0"/>
+                                  </p:stCondLst>
+                                  <p:childTnLst>
+                                    <p:animEffect transition="out" filter="fade">
+                                      <p:cBhvr>
+                                        <p:cTn id="54" dur="500"/>
+                                        <p:tgtEl>
+                                          <p:spTgt spid="16"/>
+                                        </p:tgtEl>
+                                      </p:cBhvr>
+                                    </p:animEffect>
+                                    <p:set>
+                                      <p:cBhvr>
+                                        <p:cTn id="55" dur="1" fill="hold">
+                                          <p:stCondLst>
+                                            <p:cond delay="499"/>
+                                          </p:stCondLst>
+                                        </p:cTn>
+                                        <p:tgtEl>
+                                          <p:spTgt spid="16"/>
+                                        </p:tgtEl>
+                                        <p:attrNameLst>
+                                          <p:attrName>style.visibility</p:attrName>
+                                        </p:attrNameLst>
+                                      </p:cBhvr>
+                                      <p:to>
+                                        <p:strVal val="hidden"/>
+                                      </p:to>
+                                    </p:set>
+                                  </p:childTnLst>
+                                </p:cTn>
+                              </p:par>
+                            </p:childTnLst>
+                          </p:cTn>
+                        </p:par>
+                      </p:childTnLst>
+                    </p:cTn>
+                  </p:par>
+                </p:childTnLst>
+              </p:cTn>
+              <p:prevCondLst>
+                <p:cond evt="onPrev" delay="0">
+                  <p:tgtEl>
+                    <p:sldTgt/>
+                  </p:tgtEl>
+                </p:cond>
+              </p:prevCondLst>
+              <p:nextCondLst>
+                <p:cond evt="onNext" delay="0">
+                  <p:tgtEl>
+                    <p:sldTgt/>
+                  </p:tgtEl>
+                </p:cond>
+              </p:nextCondLst>
+            </p:seq>
+          </p:childTnLst>
+        </p:cTn>
       </p:par>
     </p:tnLst>
+    <p:bldLst>
+      <p:bldP spid="8" grpId="0"/>
+      <p:bldP spid="8" grpId="1"/>
+      <p:bldP spid="21" grpId="0"/>
+      <p:bldP spid="16" grpId="0"/>
+      <p:bldP spid="16" grpId="1"/>
+      <p:bldP spid="18" grpId="0"/>
+    </p:bldLst>
   </p:timing>
 </p:sld>
 </file>
@@ -4105,7 +5453,7 @@
     </p:spTree>
     <p:extLst>
       <p:ext uri="{BB962C8B-B14F-4D97-AF65-F5344CB8AC3E}">
-        <p14:creationId xmlns:p14="http://schemas.microsoft.com/office/powerpoint/2010/main" val="458107361"/>
+        <p14:creationId xmlns:p14="http://schemas.microsoft.com/office/powerpoint/2010/main" val="1550437736"/>
       </p:ext>
     </p:extLst>
   </p:cSld>
@@ -4195,12 +5543,6 @@
           </a:p>
           <a:p>
             <a:r>
-              <a:rPr lang="en-GB" dirty="0" smtClean="0"/>
-              <a:t>Checkbox/Radio Button Binding – Checked Binder</a:t>
-            </a:r>
-          </a:p>
-          <a:p>
-            <a:r>
               <a:rPr lang="en-GB" dirty="0" smtClean="0">
                 <a:solidFill>
                   <a:schemeClr val="accent6">
@@ -4208,22 +5550,22 @@
                   </a:schemeClr>
                 </a:solidFill>
               </a:rPr>
+              <a:t>Checkbox/Radio Button Binding – Checked Binder</a:t>
+            </a:r>
+          </a:p>
+          <a:p>
+            <a:r>
+              <a:rPr lang="en-GB" dirty="0" smtClean="0"/>
               <a:t>Selection Binding – Options Binder</a:t>
             </a:r>
-            <a:endParaRPr lang="en-GB" dirty="0">
-              <a:solidFill>
-                <a:schemeClr val="accent6">
-                  <a:lumMod val="75000"/>
-                </a:schemeClr>
-              </a:solidFill>
-            </a:endParaRPr>
+            <a:endParaRPr lang="en-GB" dirty="0"/>
           </a:p>
         </p:txBody>
       </p:sp>
     </p:spTree>
     <p:extLst>
       <p:ext uri="{BB962C8B-B14F-4D97-AF65-F5344CB8AC3E}">
-        <p14:creationId xmlns:p14="http://schemas.microsoft.com/office/powerpoint/2010/main" val="3243974174"/>
+        <p14:creationId xmlns:p14="http://schemas.microsoft.com/office/powerpoint/2010/main" val="512638731"/>
       </p:ext>
     </p:extLst>
   </p:cSld>
@@ -4320,6 +5662,221 @@
     </p:spTree>
     <p:extLst>
       <p:ext uri="{BB962C8B-B14F-4D97-AF65-F5344CB8AC3E}">
+        <p14:creationId xmlns:p14="http://schemas.microsoft.com/office/powerpoint/2010/main" val="458107361"/>
+      </p:ext>
+    </p:extLst>
+  </p:cSld>
+  <p:clrMapOvr>
+    <a:masterClrMapping/>
+  </p:clrMapOvr>
+  <p:transition>
+    <p:fade/>
+  </p:transition>
+  <p:timing>
+    <p:tnLst>
+      <p:par>
+        <p:cTn id="1" dur="indefinite" restart="never" nodeType="tmRoot"/>
+      </p:par>
+    </p:tnLst>
+  </p:timing>
+</p:sld>
+</file>
+
+<file path=ppt/slides/slide14.xml><?xml version="1.0" encoding="utf-8"?>
+<p:sld xmlns:a="http://schemas.openxmlformats.org/drawingml/2006/main" xmlns:r="http://schemas.openxmlformats.org/officeDocument/2006/relationships" xmlns:p="http://schemas.openxmlformats.org/presentationml/2006/main">
+  <p:cSld>
+    <p:spTree>
+      <p:nvGrpSpPr>
+        <p:cNvPr id="1" name=""/>
+        <p:cNvGrpSpPr/>
+        <p:nvPr/>
+      </p:nvGrpSpPr>
+      <p:grpSpPr>
+        <a:xfrm>
+          <a:off x="0" y="0"/>
+          <a:ext cx="0" cy="0"/>
+          <a:chOff x="0" y="0"/>
+          <a:chExt cx="0" cy="0"/>
+        </a:xfrm>
+      </p:grpSpPr>
+      <p:sp>
+        <p:nvSpPr>
+          <p:cNvPr id="2" name="Title 1"/>
+          <p:cNvSpPr>
+            <a:spLocks noGrp="1"/>
+          </p:cNvSpPr>
+          <p:nvPr>
+            <p:ph type="title"/>
+          </p:nvPr>
+        </p:nvSpPr>
+        <p:spPr/>
+        <p:txBody>
+          <a:bodyPr/>
+          <a:lstStyle/>
+          <a:p>
+            <a:r>
+              <a:rPr lang="en-US" dirty="0" smtClean="0"/>
+              <a:t>Agenda		</a:t>
+            </a:r>
+            <a:endParaRPr lang="en-GB" dirty="0"/>
+          </a:p>
+        </p:txBody>
+      </p:sp>
+      <p:sp>
+        <p:nvSpPr>
+          <p:cNvPr id="3" name="Text Placeholder 2"/>
+          <p:cNvSpPr>
+            <a:spLocks noGrp="1"/>
+          </p:cNvSpPr>
+          <p:nvPr>
+            <p:ph type="body" idx="1"/>
+          </p:nvPr>
+        </p:nvSpPr>
+        <p:spPr/>
+        <p:txBody>
+          <a:bodyPr/>
+          <a:lstStyle/>
+          <a:p>
+            <a:r>
+              <a:rPr lang="en-US" dirty="0" smtClean="0">
+                <a:latin typeface="+mn-lt"/>
+              </a:rPr>
+              <a:t>Text Input Binding - Value Binder</a:t>
+            </a:r>
+          </a:p>
+          <a:p>
+            <a:r>
+              <a:rPr lang="en-GB" dirty="0" smtClean="0"/>
+              <a:t>Text Display Binding – Text Binder</a:t>
+            </a:r>
+          </a:p>
+          <a:p>
+            <a:r>
+              <a:rPr lang="en-GB" dirty="0" smtClean="0"/>
+              <a:t>Checkbox/Radio Button Binding – Checked Binder</a:t>
+            </a:r>
+          </a:p>
+          <a:p>
+            <a:r>
+              <a:rPr lang="en-GB" dirty="0" smtClean="0">
+                <a:solidFill>
+                  <a:schemeClr val="accent6">
+                    <a:lumMod val="75000"/>
+                  </a:schemeClr>
+                </a:solidFill>
+              </a:rPr>
+              <a:t>Selection Binding – Options Binder</a:t>
+            </a:r>
+            <a:endParaRPr lang="en-GB" dirty="0">
+              <a:solidFill>
+                <a:schemeClr val="accent6">
+                  <a:lumMod val="75000"/>
+                </a:schemeClr>
+              </a:solidFill>
+            </a:endParaRPr>
+          </a:p>
+        </p:txBody>
+      </p:sp>
+    </p:spTree>
+    <p:extLst>
+      <p:ext uri="{BB962C8B-B14F-4D97-AF65-F5344CB8AC3E}">
+        <p14:creationId xmlns:p14="http://schemas.microsoft.com/office/powerpoint/2010/main" val="3243974174"/>
+      </p:ext>
+    </p:extLst>
+  </p:cSld>
+  <p:clrMapOvr>
+    <a:masterClrMapping/>
+  </p:clrMapOvr>
+  <p:transition>
+    <p:fade/>
+  </p:transition>
+  <p:timing>
+    <p:tnLst>
+      <p:par>
+        <p:cTn id="1" dur="indefinite" restart="never" nodeType="tmRoot"/>
+      </p:par>
+    </p:tnLst>
+  </p:timing>
+</p:sld>
+</file>
+
+<file path=ppt/slides/slide15.xml><?xml version="1.0" encoding="utf-8"?>
+<p:sld xmlns:a="http://schemas.openxmlformats.org/drawingml/2006/main" xmlns:r="http://schemas.openxmlformats.org/officeDocument/2006/relationships" xmlns:p="http://schemas.openxmlformats.org/presentationml/2006/main" show="0">
+  <p:cSld>
+    <p:bg>
+      <p:bgPr>
+        <a:solidFill>
+          <a:schemeClr val="accent2"/>
+        </a:solidFill>
+        <a:effectLst/>
+      </p:bgPr>
+    </p:bg>
+    <p:spTree>
+      <p:nvGrpSpPr>
+        <p:cNvPr id="1" name=""/>
+        <p:cNvGrpSpPr/>
+        <p:nvPr/>
+      </p:nvGrpSpPr>
+      <p:grpSpPr>
+        <a:xfrm>
+          <a:off x="0" y="0"/>
+          <a:ext cx="0" cy="0"/>
+          <a:chOff x="0" y="0"/>
+          <a:chExt cx="0" cy="0"/>
+        </a:xfrm>
+      </p:grpSpPr>
+      <p:sp>
+        <p:nvSpPr>
+          <p:cNvPr id="2" name="Title 1"/>
+          <p:cNvSpPr>
+            <a:spLocks noGrp="1"/>
+          </p:cNvSpPr>
+          <p:nvPr>
+            <p:ph type="title"/>
+          </p:nvPr>
+        </p:nvSpPr>
+        <p:spPr/>
+        <p:txBody>
+          <a:bodyPr/>
+          <a:lstStyle/>
+          <a:p>
+            <a:r>
+              <a:rPr lang="en-US" dirty="0" smtClean="0"/>
+              <a:t>END OF Overview Slides		</a:t>
+            </a:r>
+            <a:endParaRPr lang="en-GB" dirty="0"/>
+          </a:p>
+        </p:txBody>
+      </p:sp>
+      <p:sp>
+        <p:nvSpPr>
+          <p:cNvPr id="3" name="Text Placeholder 2"/>
+          <p:cNvSpPr>
+            <a:spLocks noGrp="1"/>
+          </p:cNvSpPr>
+          <p:nvPr>
+            <p:ph type="body" idx="1"/>
+          </p:nvPr>
+        </p:nvSpPr>
+        <p:spPr/>
+        <p:txBody>
+          <a:bodyPr/>
+          <a:lstStyle/>
+          <a:p>
+            <a:pPr marL="0" indent="0">
+              <a:buNone/>
+            </a:pPr>
+            <a:r>
+              <a:rPr lang="en-GB" dirty="0" smtClean="0"/>
+              <a:t>	</a:t>
+            </a:r>
+            <a:endParaRPr lang="en-GB" dirty="0"/>
+          </a:p>
+        </p:txBody>
+      </p:sp>
+    </p:spTree>
+    <p:extLst>
+      <p:ext uri="{BB962C8B-B14F-4D97-AF65-F5344CB8AC3E}">
         <p14:creationId xmlns:p14="http://schemas.microsoft.com/office/powerpoint/2010/main" val="2948279808"/>
       </p:ext>
     </p:extLst>
@@ -4340,7 +5897,7 @@
 </p:sld>
 </file>
 
-<file path=ppt/slides/slide14.xml><?xml version="1.0" encoding="utf-8"?>
+<file path=ppt/slides/slide16.xml><?xml version="1.0" encoding="utf-8"?>
 <p:sld xmlns:a="http://schemas.openxmlformats.org/drawingml/2006/main" xmlns:r="http://schemas.openxmlformats.org/officeDocument/2006/relationships" xmlns:p="http://schemas.openxmlformats.org/presentationml/2006/main">
   <p:cSld>
     <p:spTree>
@@ -8904,16 +10461,8 @@
 </file>
 
 <file path=ppt/slides/slide9.xml><?xml version="1.0" encoding="utf-8"?>
-<p:sld xmlns:a="http://schemas.openxmlformats.org/drawingml/2006/main" xmlns:r="http://schemas.openxmlformats.org/officeDocument/2006/relationships" xmlns:p="http://schemas.openxmlformats.org/presentationml/2006/main" show="0">
+<p:sld xmlns:a="http://schemas.openxmlformats.org/drawingml/2006/main" xmlns:r="http://schemas.openxmlformats.org/officeDocument/2006/relationships" xmlns:p="http://schemas.openxmlformats.org/presentationml/2006/main">
   <p:cSld>
-    <p:bg>
-      <p:bgPr>
-        <a:solidFill>
-          <a:schemeClr val="accent2"/>
-        </a:solidFill>
-        <a:effectLst/>
-      </p:bgPr>
-    </p:bg>
     <p:spTree>
       <p:nvGrpSpPr>
         <p:cNvPr id="1" name=""/>
@@ -8928,6 +10477,30 @@
           <a:chExt cx="0" cy="0"/>
         </a:xfrm>
       </p:grpSpPr>
+      <p:pic>
+        <p:nvPicPr>
+          <p:cNvPr id="3" name="Picture 2"/>
+          <p:cNvPicPr>
+            <a:picLocks noChangeAspect="1"/>
+          </p:cNvPicPr>
+          <p:nvPr/>
+        </p:nvPicPr>
+        <p:blipFill>
+          <a:blip r:embed="rId3"/>
+          <a:stretch>
+            <a:fillRect/>
+          </a:stretch>
+        </p:blipFill>
+        <p:spPr>
+          <a:xfrm>
+            <a:off x="835908" y="1857375"/>
+            <a:ext cx="3829050" cy="819150"/>
+          </a:xfrm>
+          <a:prstGeom prst="rect">
+            <a:avLst/>
+          </a:prstGeom>
+        </p:spPr>
+      </p:pic>
       <p:sp>
         <p:nvSpPr>
           <p:cNvPr id="2" name="Title 1"/>
@@ -8945,42 +10518,195 @@
           <a:p>
             <a:r>
               <a:rPr lang="en-US" dirty="0" smtClean="0"/>
-              <a:t>END OF Overview Slides		</a:t>
+              <a:t>Text </a:t>
+            </a:r>
+            <a:r>
+              <a:rPr lang="en-US" dirty="0" smtClean="0"/>
+              <a:t>Display </a:t>
+            </a:r>
+            <a:r>
+              <a:rPr lang="en-US" dirty="0" smtClean="0"/>
+              <a:t>Binding – </a:t>
+            </a:r>
+            <a:r>
+              <a:rPr lang="en-US" dirty="0" err="1" smtClean="0"/>
+              <a:t>Xaml</a:t>
+            </a:r>
+            <a:r>
+              <a:rPr lang="en-US" dirty="0" smtClean="0"/>
+              <a:t> Way</a:t>
             </a:r>
             <a:endParaRPr lang="en-GB" dirty="0"/>
+          </a:p>
+        </p:txBody>
+      </p:sp>
+      <p:cxnSp>
+        <p:nvCxnSpPr>
+          <p:cNvPr id="7" name="Straight Arrow Connector 6"/>
+          <p:cNvCxnSpPr/>
+          <p:nvPr/>
+        </p:nvCxnSpPr>
+        <p:spPr bwMode="auto">
+          <a:xfrm flipH="1">
+            <a:off x="4876801" y="2267634"/>
+            <a:ext cx="1066799" cy="18366"/>
+          </a:xfrm>
+          <a:prstGeom prst="straightConnector1">
+            <a:avLst/>
+          </a:prstGeom>
+          <a:ln w="63500">
+            <a:solidFill>
+              <a:schemeClr val="tx1"/>
+            </a:solidFill>
+            <a:headEnd type="none" w="med" len="med"/>
+            <a:tailEnd type="triangle"/>
+          </a:ln>
+        </p:spPr>
+        <p:style>
+          <a:lnRef idx="1">
+            <a:schemeClr val="accent2"/>
+          </a:lnRef>
+          <a:fillRef idx="0">
+            <a:schemeClr val="accent2"/>
+          </a:fillRef>
+          <a:effectRef idx="0">
+            <a:schemeClr val="accent2"/>
+          </a:effectRef>
+          <a:fontRef idx="minor">
+            <a:schemeClr val="tx1"/>
+          </a:fontRef>
+        </p:style>
+      </p:cxnSp>
+      <p:sp>
+        <p:nvSpPr>
+          <p:cNvPr id="8" name="TextBox 7"/>
+          <p:cNvSpPr txBox="1"/>
+          <p:nvPr/>
+        </p:nvSpPr>
+        <p:spPr bwMode="auto">
+          <a:xfrm>
+            <a:off x="6070417" y="2069068"/>
+            <a:ext cx="2446311" cy="369332"/>
+          </a:xfrm>
+          <a:prstGeom prst="rect">
+            <a:avLst/>
+          </a:prstGeom>
+          <a:noFill/>
+          <a:ln w="9525">
+            <a:noFill/>
+            <a:miter lim="800000"/>
+            <a:headEnd/>
+            <a:tailEnd/>
+          </a:ln>
+        </p:spPr>
+        <p:txBody>
+          <a:bodyPr wrap="square" rtlCol="0">
+            <a:spAutoFit/>
+          </a:bodyPr>
+          <a:lstStyle/>
+          <a:p>
+            <a:r>
+              <a:rPr lang="en-US" dirty="0" smtClean="0">
+                <a:solidFill>
+                  <a:prstClr val="black"/>
+                </a:solidFill>
+                <a:latin typeface="Myriad Pro"/>
+              </a:rPr>
+              <a:t>Text Binding </a:t>
+            </a:r>
+            <a:endParaRPr lang="en-US" dirty="0">
+              <a:solidFill>
+                <a:prstClr val="black"/>
+              </a:solidFill>
+              <a:latin typeface="Myriad Pro"/>
+            </a:endParaRPr>
           </a:p>
         </p:txBody>
       </p:sp>
       <p:sp>
         <p:nvSpPr>
-          <p:cNvPr id="3" name="Text Placeholder 2"/>
-          <p:cNvSpPr>
-            <a:spLocks noGrp="1"/>
-          </p:cNvSpPr>
-          <p:nvPr>
-            <p:ph type="body" idx="1"/>
-          </p:nvPr>
+          <p:cNvPr id="21" name="TextBox 20"/>
+          <p:cNvSpPr txBox="1"/>
+          <p:nvPr/>
         </p:nvSpPr>
-        <p:spPr/>
+        <p:spPr bwMode="auto">
+          <a:xfrm>
+            <a:off x="816153" y="1267557"/>
+            <a:ext cx="2844983" cy="369332"/>
+          </a:xfrm>
+          <a:prstGeom prst="rect">
+            <a:avLst/>
+          </a:prstGeom>
+          <a:noFill/>
+          <a:ln w="9525">
+            <a:noFill/>
+            <a:miter lim="800000"/>
+            <a:headEnd/>
+            <a:tailEnd/>
+          </a:ln>
+        </p:spPr>
         <p:txBody>
-          <a:bodyPr/>
+          <a:bodyPr wrap="square" rtlCol="0">
+            <a:spAutoFit/>
+          </a:bodyPr>
           <a:lstStyle/>
           <a:p>
-            <a:pPr marL="0" indent="0">
-              <a:buNone/>
-            </a:pPr>
-            <a:r>
-              <a:rPr lang="en-GB" dirty="0" smtClean="0"/>
-              <a:t>	</a:t>
-            </a:r>
-            <a:endParaRPr lang="en-GB" dirty="0"/>
+            <a:r>
+              <a:rPr lang="en-US" dirty="0" smtClean="0">
+                <a:solidFill>
+                  <a:prstClr val="black"/>
+                </a:solidFill>
+                <a:latin typeface="Myriad Pro"/>
+              </a:rPr>
+              <a:t>Basic Binding</a:t>
+            </a:r>
+            <a:endParaRPr lang="en-US" dirty="0">
+              <a:solidFill>
+                <a:prstClr val="black"/>
+              </a:solidFill>
+              <a:latin typeface="Myriad Pro"/>
+            </a:endParaRPr>
           </a:p>
         </p:txBody>
       </p:sp>
+      <p:cxnSp>
+        <p:nvCxnSpPr>
+          <p:cNvPr id="20" name="Straight Connector 19"/>
+          <p:cNvCxnSpPr/>
+          <p:nvPr/>
+        </p:nvCxnSpPr>
+        <p:spPr bwMode="auto">
+          <a:xfrm>
+            <a:off x="2331618" y="2438400"/>
+            <a:ext cx="1935582" cy="0"/>
+          </a:xfrm>
+          <a:prstGeom prst="line">
+            <a:avLst/>
+          </a:prstGeom>
+          <a:ln>
+            <a:headEnd type="none" w="med" len="med"/>
+            <a:tailEnd type="none" w="med" len="med"/>
+          </a:ln>
+        </p:spPr>
+        <p:style>
+          <a:lnRef idx="3">
+            <a:schemeClr val="accent1"/>
+          </a:lnRef>
+          <a:fillRef idx="0">
+            <a:schemeClr val="accent1"/>
+          </a:fillRef>
+          <a:effectRef idx="2">
+            <a:schemeClr val="accent1"/>
+          </a:effectRef>
+          <a:fontRef idx="minor">
+            <a:schemeClr val="tx1"/>
+          </a:fontRef>
+        </p:style>
+      </p:cxnSp>
     </p:spTree>
     <p:extLst>
       <p:ext uri="{BB962C8B-B14F-4D97-AF65-F5344CB8AC3E}">
-        <p14:creationId xmlns:p14="http://schemas.microsoft.com/office/powerpoint/2010/main" val="1550437736"/>
+        <p14:creationId xmlns:p14="http://schemas.microsoft.com/office/powerpoint/2010/main" val="975407436"/>
       </p:ext>
     </p:extLst>
   </p:cSld>
@@ -8993,9 +10719,210 @@
   <p:timing>
     <p:tnLst>
       <p:par>
-        <p:cTn id="1" dur="indefinite" restart="never" nodeType="tmRoot"/>
+        <p:cTn id="1" dur="indefinite" restart="never" nodeType="tmRoot">
+          <p:childTnLst>
+            <p:seq concurrent="1" nextAc="seek">
+              <p:cTn id="2" dur="indefinite" nodeType="mainSeq">
+                <p:childTnLst>
+                  <p:par>
+                    <p:cTn id="3" fill="hold">
+                      <p:stCondLst>
+                        <p:cond delay="indefinite"/>
+                        <p:cond evt="onBegin" delay="0">
+                          <p:tn val="2"/>
+                        </p:cond>
+                      </p:stCondLst>
+                      <p:childTnLst>
+                        <p:par>
+                          <p:cTn id="4" fill="hold">
+                            <p:stCondLst>
+                              <p:cond delay="0"/>
+                            </p:stCondLst>
+                            <p:childTnLst>
+                              <p:par>
+                                <p:cTn id="5" presetID="1" presetClass="entr" presetSubtype="0" fill="hold" grpId="0" nodeType="withEffect">
+                                  <p:stCondLst>
+                                    <p:cond delay="0"/>
+                                  </p:stCondLst>
+                                  <p:childTnLst>
+                                    <p:set>
+                                      <p:cBhvr>
+                                        <p:cTn id="6" dur="1" fill="hold">
+                                          <p:stCondLst>
+                                            <p:cond delay="0"/>
+                                          </p:stCondLst>
+                                        </p:cTn>
+                                        <p:tgtEl>
+                                          <p:spTgt spid="21"/>
+                                        </p:tgtEl>
+                                        <p:attrNameLst>
+                                          <p:attrName>style.visibility</p:attrName>
+                                        </p:attrNameLst>
+                                      </p:cBhvr>
+                                      <p:to>
+                                        <p:strVal val="visible"/>
+                                      </p:to>
+                                    </p:set>
+                                  </p:childTnLst>
+                                </p:cTn>
+                              </p:par>
+                              <p:par>
+                                <p:cTn id="7" presetID="1" presetClass="entr" presetSubtype="0" fill="hold" nodeType="withEffect">
+                                  <p:stCondLst>
+                                    <p:cond delay="0"/>
+                                  </p:stCondLst>
+                                  <p:childTnLst>
+                                    <p:set>
+                                      <p:cBhvr>
+                                        <p:cTn id="8" dur="1" fill="hold">
+                                          <p:stCondLst>
+                                            <p:cond delay="0"/>
+                                          </p:stCondLst>
+                                        </p:cTn>
+                                        <p:tgtEl>
+                                          <p:spTgt spid="3"/>
+                                        </p:tgtEl>
+                                        <p:attrNameLst>
+                                          <p:attrName>style.visibility</p:attrName>
+                                        </p:attrNameLst>
+                                      </p:cBhvr>
+                                      <p:to>
+                                        <p:strVal val="visible"/>
+                                      </p:to>
+                                    </p:set>
+                                  </p:childTnLst>
+                                </p:cTn>
+                              </p:par>
+                            </p:childTnLst>
+                          </p:cTn>
+                        </p:par>
+                      </p:childTnLst>
+                    </p:cTn>
+                  </p:par>
+                  <p:par>
+                    <p:cTn id="9" fill="hold">
+                      <p:stCondLst>
+                        <p:cond delay="indefinite"/>
+                      </p:stCondLst>
+                      <p:childTnLst>
+                        <p:par>
+                          <p:cTn id="10" fill="hold">
+                            <p:stCondLst>
+                              <p:cond delay="0"/>
+                            </p:stCondLst>
+                            <p:childTnLst>
+                              <p:par>
+                                <p:cTn id="11" presetID="1" presetClass="entr" presetSubtype="0" fill="hold" nodeType="clickEffect">
+                                  <p:stCondLst>
+                                    <p:cond delay="0"/>
+                                  </p:stCondLst>
+                                  <p:childTnLst>
+                                    <p:set>
+                                      <p:cBhvr>
+                                        <p:cTn id="12" dur="1" fill="hold">
+                                          <p:stCondLst>
+                                            <p:cond delay="0"/>
+                                          </p:stCondLst>
+                                        </p:cTn>
+                                        <p:tgtEl>
+                                          <p:spTgt spid="7"/>
+                                        </p:tgtEl>
+                                        <p:attrNameLst>
+                                          <p:attrName>style.visibility</p:attrName>
+                                        </p:attrNameLst>
+                                      </p:cBhvr>
+                                      <p:to>
+                                        <p:strVal val="visible"/>
+                                      </p:to>
+                                    </p:set>
+                                  </p:childTnLst>
+                                </p:cTn>
+                              </p:par>
+                              <p:par>
+                                <p:cTn id="13" presetID="1" presetClass="entr" presetSubtype="0" fill="hold" grpId="0" nodeType="withEffect">
+                                  <p:stCondLst>
+                                    <p:cond delay="0"/>
+                                  </p:stCondLst>
+                                  <p:childTnLst>
+                                    <p:set>
+                                      <p:cBhvr>
+                                        <p:cTn id="14" dur="1" fill="hold">
+                                          <p:stCondLst>
+                                            <p:cond delay="0"/>
+                                          </p:stCondLst>
+                                        </p:cTn>
+                                        <p:tgtEl>
+                                          <p:spTgt spid="8"/>
+                                        </p:tgtEl>
+                                        <p:attrNameLst>
+                                          <p:attrName>style.visibility</p:attrName>
+                                        </p:attrNameLst>
+                                      </p:cBhvr>
+                                      <p:to>
+                                        <p:strVal val="visible"/>
+                                      </p:to>
+                                    </p:set>
+                                  </p:childTnLst>
+                                </p:cTn>
+                              </p:par>
+                              <p:par>
+                                <p:cTn id="15" presetID="1" presetClass="entr" presetSubtype="0" fill="hold" nodeType="withEffect">
+                                  <p:stCondLst>
+                                    <p:cond delay="0"/>
+                                  </p:stCondLst>
+                                  <p:childTnLst>
+                                    <p:set>
+                                      <p:cBhvr>
+                                        <p:cTn id="16" dur="1" fill="hold">
+                                          <p:stCondLst>
+                                            <p:cond delay="0"/>
+                                          </p:stCondLst>
+                                        </p:cTn>
+                                        <p:tgtEl>
+                                          <p:spTgt spid="20"/>
+                                        </p:tgtEl>
+                                        <p:attrNameLst>
+                                          <p:attrName>style.visibility</p:attrName>
+                                        </p:attrNameLst>
+                                      </p:cBhvr>
+                                      <p:to>
+                                        <p:strVal val="visible"/>
+                                      </p:to>
+                                    </p:set>
+                                  </p:childTnLst>
+                                </p:cTn>
+                              </p:par>
+                            </p:childTnLst>
+                          </p:cTn>
+                        </p:par>
+                      </p:childTnLst>
+                    </p:cTn>
+                  </p:par>
+                </p:childTnLst>
+              </p:cTn>
+              <p:prevCondLst>
+                <p:cond evt="onPrev" delay="0">
+                  <p:tgtEl>
+                    <p:sldTgt/>
+                  </p:tgtEl>
+                </p:cond>
+              </p:prevCondLst>
+              <p:nextCondLst>
+                <p:cond evt="onNext" delay="0">
+                  <p:tgtEl>
+                    <p:sldTgt/>
+                  </p:tgtEl>
+                </p:cond>
+              </p:nextCondLst>
+            </p:seq>
+          </p:childTnLst>
+        </p:cTn>
       </p:par>
     </p:tnLst>
+    <p:bldLst>
+      <p:bldP spid="8" grpId="0"/>
+      <p:bldP spid="21" grpId="0"/>
+    </p:bldLst>
   </p:timing>
 </p:sld>
 </file>

</xml_diff>